<commit_message>
prepare first sdk schematic for overview
</commit_message>
<xml_diff>
--- a/SDKUserGuide/images/sdk_overview.pptx
+++ b/SDKUserGuide/images/sdk_overview.pptx
@@ -134,7 +134,7 @@
           <p:cNvPr id="2" name="Title 1">
             <a:extLst>
               <a:ext uri="{FF2B5EF4-FFF2-40B4-BE49-F238E27FC236}">
-                <a16:creationId xmlns:a16="http://schemas.microsoft.com/office/drawing/2014/main" id="{4243E3D0-5767-407F-872C-2BAB208E45C9}"/>
+                <a16:creationId xmlns:a16="http://schemas.microsoft.com/office/drawing/2014/main" xmlns="" id="{4243E3D0-5767-407F-872C-2BAB208E45C9}"/>
               </a:ext>
             </a:extLst>
           </p:cNvPr>
@@ -171,7 +171,7 @@
           <p:cNvPr id="3" name="Subtitle 2">
             <a:extLst>
               <a:ext uri="{FF2B5EF4-FFF2-40B4-BE49-F238E27FC236}">
-                <a16:creationId xmlns:a16="http://schemas.microsoft.com/office/drawing/2014/main" id="{B5C0D0C4-6FFE-40AB-AE8E-74B8A9323106}"/>
+                <a16:creationId xmlns:a16="http://schemas.microsoft.com/office/drawing/2014/main" xmlns="" id="{B5C0D0C4-6FFE-40AB-AE8E-74B8A9323106}"/>
               </a:ext>
             </a:extLst>
           </p:cNvPr>
@@ -241,7 +241,7 @@
           <p:cNvPr id="4" name="Date Placeholder 3">
             <a:extLst>
               <a:ext uri="{FF2B5EF4-FFF2-40B4-BE49-F238E27FC236}">
-                <a16:creationId xmlns:a16="http://schemas.microsoft.com/office/drawing/2014/main" id="{57FF27FE-F48A-41D9-AF18-CEC519A88593}"/>
+                <a16:creationId xmlns:a16="http://schemas.microsoft.com/office/drawing/2014/main" xmlns="" id="{57FF27FE-F48A-41D9-AF18-CEC519A88593}"/>
               </a:ext>
             </a:extLst>
           </p:cNvPr>
@@ -259,7 +259,7 @@
           <a:p>
             <a:fld id="{A3AE657A-D284-404D-960B-6B1864A84D1B}" type="datetimeFigureOut">
               <a:rPr lang="en-US" smtClean="0"/>
-              <a:t>9/30/2021</a:t>
+              <a:t>3/28/2022</a:t>
             </a:fld>
             <a:endParaRPr lang="en-US"/>
           </a:p>
@@ -270,7 +270,7 @@
           <p:cNvPr id="5" name="Footer Placeholder 4">
             <a:extLst>
               <a:ext uri="{FF2B5EF4-FFF2-40B4-BE49-F238E27FC236}">
-                <a16:creationId xmlns:a16="http://schemas.microsoft.com/office/drawing/2014/main" id="{79874C1E-7A1F-44C5-9BE3-8AACC708AF2B}"/>
+                <a16:creationId xmlns:a16="http://schemas.microsoft.com/office/drawing/2014/main" xmlns="" id="{79874C1E-7A1F-44C5-9BE3-8AACC708AF2B}"/>
               </a:ext>
             </a:extLst>
           </p:cNvPr>
@@ -295,7 +295,7 @@
           <p:cNvPr id="6" name="Slide Number Placeholder 5">
             <a:extLst>
               <a:ext uri="{FF2B5EF4-FFF2-40B4-BE49-F238E27FC236}">
-                <a16:creationId xmlns:a16="http://schemas.microsoft.com/office/drawing/2014/main" id="{0E5D5769-2CFE-4279-8005-3A358A0C9F7C}"/>
+                <a16:creationId xmlns:a16="http://schemas.microsoft.com/office/drawing/2014/main" xmlns="" id="{0E5D5769-2CFE-4279-8005-3A358A0C9F7C}"/>
               </a:ext>
             </a:extLst>
           </p:cNvPr>
@@ -354,7 +354,7 @@
           <p:cNvPr id="2" name="Title 1">
             <a:extLst>
               <a:ext uri="{FF2B5EF4-FFF2-40B4-BE49-F238E27FC236}">
-                <a16:creationId xmlns:a16="http://schemas.microsoft.com/office/drawing/2014/main" id="{E493B8E1-AB84-4A19-99A8-8FFDBBA42EEC}"/>
+                <a16:creationId xmlns:a16="http://schemas.microsoft.com/office/drawing/2014/main" xmlns="" id="{E493B8E1-AB84-4A19-99A8-8FFDBBA42EEC}"/>
               </a:ext>
             </a:extLst>
           </p:cNvPr>
@@ -382,7 +382,7 @@
           <p:cNvPr id="3" name="Vertical Text Placeholder 2">
             <a:extLst>
               <a:ext uri="{FF2B5EF4-FFF2-40B4-BE49-F238E27FC236}">
-                <a16:creationId xmlns:a16="http://schemas.microsoft.com/office/drawing/2014/main" id="{504EE673-0442-44CD-AD99-883EA8042F6C}"/>
+                <a16:creationId xmlns:a16="http://schemas.microsoft.com/office/drawing/2014/main" xmlns="" id="{504EE673-0442-44CD-AD99-883EA8042F6C}"/>
               </a:ext>
             </a:extLst>
           </p:cNvPr>
@@ -439,7 +439,7 @@
           <p:cNvPr id="4" name="Date Placeholder 3">
             <a:extLst>
               <a:ext uri="{FF2B5EF4-FFF2-40B4-BE49-F238E27FC236}">
-                <a16:creationId xmlns:a16="http://schemas.microsoft.com/office/drawing/2014/main" id="{BD4D62BC-979E-414F-ACA2-719E3126E0D3}"/>
+                <a16:creationId xmlns:a16="http://schemas.microsoft.com/office/drawing/2014/main" xmlns="" id="{BD4D62BC-979E-414F-ACA2-719E3126E0D3}"/>
               </a:ext>
             </a:extLst>
           </p:cNvPr>
@@ -457,7 +457,7 @@
           <a:p>
             <a:fld id="{A3AE657A-D284-404D-960B-6B1864A84D1B}" type="datetimeFigureOut">
               <a:rPr lang="en-US" smtClean="0"/>
-              <a:t>9/30/2021</a:t>
+              <a:t>3/28/2022</a:t>
             </a:fld>
             <a:endParaRPr lang="en-US"/>
           </a:p>
@@ -468,7 +468,7 @@
           <p:cNvPr id="5" name="Footer Placeholder 4">
             <a:extLst>
               <a:ext uri="{FF2B5EF4-FFF2-40B4-BE49-F238E27FC236}">
-                <a16:creationId xmlns:a16="http://schemas.microsoft.com/office/drawing/2014/main" id="{12648AE1-E942-4187-A24B-744428AD156E}"/>
+                <a16:creationId xmlns:a16="http://schemas.microsoft.com/office/drawing/2014/main" xmlns="" id="{12648AE1-E942-4187-A24B-744428AD156E}"/>
               </a:ext>
             </a:extLst>
           </p:cNvPr>
@@ -493,7 +493,7 @@
           <p:cNvPr id="6" name="Slide Number Placeholder 5">
             <a:extLst>
               <a:ext uri="{FF2B5EF4-FFF2-40B4-BE49-F238E27FC236}">
-                <a16:creationId xmlns:a16="http://schemas.microsoft.com/office/drawing/2014/main" id="{AAD573CE-9206-4A7C-899B-1B52C566D467}"/>
+                <a16:creationId xmlns:a16="http://schemas.microsoft.com/office/drawing/2014/main" xmlns="" id="{AAD573CE-9206-4A7C-899B-1B52C566D467}"/>
               </a:ext>
             </a:extLst>
           </p:cNvPr>
@@ -552,7 +552,7 @@
           <p:cNvPr id="2" name="Vertical Title 1">
             <a:extLst>
               <a:ext uri="{FF2B5EF4-FFF2-40B4-BE49-F238E27FC236}">
-                <a16:creationId xmlns:a16="http://schemas.microsoft.com/office/drawing/2014/main" id="{48AAB1A3-8764-420F-AD44-A386ECB4FCFB}"/>
+                <a16:creationId xmlns:a16="http://schemas.microsoft.com/office/drawing/2014/main" xmlns="" id="{48AAB1A3-8764-420F-AD44-A386ECB4FCFB}"/>
               </a:ext>
             </a:extLst>
           </p:cNvPr>
@@ -585,7 +585,7 @@
           <p:cNvPr id="3" name="Vertical Text Placeholder 2">
             <a:extLst>
               <a:ext uri="{FF2B5EF4-FFF2-40B4-BE49-F238E27FC236}">
-                <a16:creationId xmlns:a16="http://schemas.microsoft.com/office/drawing/2014/main" id="{FF710454-AC41-4FDA-8919-231447E90BA2}"/>
+                <a16:creationId xmlns:a16="http://schemas.microsoft.com/office/drawing/2014/main" xmlns="" id="{FF710454-AC41-4FDA-8919-231447E90BA2}"/>
               </a:ext>
             </a:extLst>
           </p:cNvPr>
@@ -647,7 +647,7 @@
           <p:cNvPr id="4" name="Date Placeholder 3">
             <a:extLst>
               <a:ext uri="{FF2B5EF4-FFF2-40B4-BE49-F238E27FC236}">
-                <a16:creationId xmlns:a16="http://schemas.microsoft.com/office/drawing/2014/main" id="{45DC499D-E247-4929-9A1C-407F23EA021F}"/>
+                <a16:creationId xmlns:a16="http://schemas.microsoft.com/office/drawing/2014/main" xmlns="" id="{45DC499D-E247-4929-9A1C-407F23EA021F}"/>
               </a:ext>
             </a:extLst>
           </p:cNvPr>
@@ -665,7 +665,7 @@
           <a:p>
             <a:fld id="{A3AE657A-D284-404D-960B-6B1864A84D1B}" type="datetimeFigureOut">
               <a:rPr lang="en-US" smtClean="0"/>
-              <a:t>9/30/2021</a:t>
+              <a:t>3/28/2022</a:t>
             </a:fld>
             <a:endParaRPr lang="en-US"/>
           </a:p>
@@ -676,7 +676,7 @@
           <p:cNvPr id="5" name="Footer Placeholder 4">
             <a:extLst>
               <a:ext uri="{FF2B5EF4-FFF2-40B4-BE49-F238E27FC236}">
-                <a16:creationId xmlns:a16="http://schemas.microsoft.com/office/drawing/2014/main" id="{4B3E01FA-FBBE-4A21-A2AC-EBEAABA022E2}"/>
+                <a16:creationId xmlns:a16="http://schemas.microsoft.com/office/drawing/2014/main" xmlns="" id="{4B3E01FA-FBBE-4A21-A2AC-EBEAABA022E2}"/>
               </a:ext>
             </a:extLst>
           </p:cNvPr>
@@ -701,7 +701,7 @@
           <p:cNvPr id="6" name="Slide Number Placeholder 5">
             <a:extLst>
               <a:ext uri="{FF2B5EF4-FFF2-40B4-BE49-F238E27FC236}">
-                <a16:creationId xmlns:a16="http://schemas.microsoft.com/office/drawing/2014/main" id="{EA7DE12E-2AF2-48E0-B454-6D04AFB32A85}"/>
+                <a16:creationId xmlns:a16="http://schemas.microsoft.com/office/drawing/2014/main" xmlns="" id="{EA7DE12E-2AF2-48E0-B454-6D04AFB32A85}"/>
               </a:ext>
             </a:extLst>
           </p:cNvPr>
@@ -760,7 +760,7 @@
           <p:cNvPr id="2" name="Title 1">
             <a:extLst>
               <a:ext uri="{FF2B5EF4-FFF2-40B4-BE49-F238E27FC236}">
-                <a16:creationId xmlns:a16="http://schemas.microsoft.com/office/drawing/2014/main" id="{0E1B28FB-8487-4D52-88BB-8F326D508605}"/>
+                <a16:creationId xmlns:a16="http://schemas.microsoft.com/office/drawing/2014/main" xmlns="" id="{0E1B28FB-8487-4D52-88BB-8F326D508605}"/>
               </a:ext>
             </a:extLst>
           </p:cNvPr>
@@ -788,7 +788,7 @@
           <p:cNvPr id="3" name="Content Placeholder 2">
             <a:extLst>
               <a:ext uri="{FF2B5EF4-FFF2-40B4-BE49-F238E27FC236}">
-                <a16:creationId xmlns:a16="http://schemas.microsoft.com/office/drawing/2014/main" id="{B5E60C55-2213-4A0A-8D34-6DC18B740A4D}"/>
+                <a16:creationId xmlns:a16="http://schemas.microsoft.com/office/drawing/2014/main" xmlns="" id="{B5E60C55-2213-4A0A-8D34-6DC18B740A4D}"/>
               </a:ext>
             </a:extLst>
           </p:cNvPr>
@@ -845,7 +845,7 @@
           <p:cNvPr id="4" name="Date Placeholder 3">
             <a:extLst>
               <a:ext uri="{FF2B5EF4-FFF2-40B4-BE49-F238E27FC236}">
-                <a16:creationId xmlns:a16="http://schemas.microsoft.com/office/drawing/2014/main" id="{114A91A5-54C2-41A6-AD1F-295D574EEF1F}"/>
+                <a16:creationId xmlns:a16="http://schemas.microsoft.com/office/drawing/2014/main" xmlns="" id="{114A91A5-54C2-41A6-AD1F-295D574EEF1F}"/>
               </a:ext>
             </a:extLst>
           </p:cNvPr>
@@ -863,7 +863,7 @@
           <a:p>
             <a:fld id="{A3AE657A-D284-404D-960B-6B1864A84D1B}" type="datetimeFigureOut">
               <a:rPr lang="en-US" smtClean="0"/>
-              <a:t>9/30/2021</a:t>
+              <a:t>3/28/2022</a:t>
             </a:fld>
             <a:endParaRPr lang="en-US"/>
           </a:p>
@@ -874,7 +874,7 @@
           <p:cNvPr id="5" name="Footer Placeholder 4">
             <a:extLst>
               <a:ext uri="{FF2B5EF4-FFF2-40B4-BE49-F238E27FC236}">
-                <a16:creationId xmlns:a16="http://schemas.microsoft.com/office/drawing/2014/main" id="{E1A26EFA-E991-43E7-9C78-B4BB6ECE4A41}"/>
+                <a16:creationId xmlns:a16="http://schemas.microsoft.com/office/drawing/2014/main" xmlns="" id="{E1A26EFA-E991-43E7-9C78-B4BB6ECE4A41}"/>
               </a:ext>
             </a:extLst>
           </p:cNvPr>
@@ -899,7 +899,7 @@
           <p:cNvPr id="6" name="Slide Number Placeholder 5">
             <a:extLst>
               <a:ext uri="{FF2B5EF4-FFF2-40B4-BE49-F238E27FC236}">
-                <a16:creationId xmlns:a16="http://schemas.microsoft.com/office/drawing/2014/main" id="{3CD36FE9-589F-4A0F-AAE5-46A53382A676}"/>
+                <a16:creationId xmlns:a16="http://schemas.microsoft.com/office/drawing/2014/main" xmlns="" id="{3CD36FE9-589F-4A0F-AAE5-46A53382A676}"/>
               </a:ext>
             </a:extLst>
           </p:cNvPr>
@@ -958,7 +958,7 @@
           <p:cNvPr id="2" name="Title 1">
             <a:extLst>
               <a:ext uri="{FF2B5EF4-FFF2-40B4-BE49-F238E27FC236}">
-                <a16:creationId xmlns:a16="http://schemas.microsoft.com/office/drawing/2014/main" id="{0627631A-428C-4235-B3B3-5CF0755771CA}"/>
+                <a16:creationId xmlns:a16="http://schemas.microsoft.com/office/drawing/2014/main" xmlns="" id="{0627631A-428C-4235-B3B3-5CF0755771CA}"/>
               </a:ext>
             </a:extLst>
           </p:cNvPr>
@@ -995,7 +995,7 @@
           <p:cNvPr id="3" name="Text Placeholder 2">
             <a:extLst>
               <a:ext uri="{FF2B5EF4-FFF2-40B4-BE49-F238E27FC236}">
-                <a16:creationId xmlns:a16="http://schemas.microsoft.com/office/drawing/2014/main" id="{70C4FE9A-A32C-4B26-BC26-8394C7C01A2B}"/>
+                <a16:creationId xmlns:a16="http://schemas.microsoft.com/office/drawing/2014/main" xmlns="" id="{70C4FE9A-A32C-4B26-BC26-8394C7C01A2B}"/>
               </a:ext>
             </a:extLst>
           </p:cNvPr>
@@ -1120,7 +1120,7 @@
           <p:cNvPr id="4" name="Date Placeholder 3">
             <a:extLst>
               <a:ext uri="{FF2B5EF4-FFF2-40B4-BE49-F238E27FC236}">
-                <a16:creationId xmlns:a16="http://schemas.microsoft.com/office/drawing/2014/main" id="{51DC7A1A-32CE-43D4-A34D-7D167EBE1B03}"/>
+                <a16:creationId xmlns:a16="http://schemas.microsoft.com/office/drawing/2014/main" xmlns="" id="{51DC7A1A-32CE-43D4-A34D-7D167EBE1B03}"/>
               </a:ext>
             </a:extLst>
           </p:cNvPr>
@@ -1138,7 +1138,7 @@
           <a:p>
             <a:fld id="{A3AE657A-D284-404D-960B-6B1864A84D1B}" type="datetimeFigureOut">
               <a:rPr lang="en-US" smtClean="0"/>
-              <a:t>9/30/2021</a:t>
+              <a:t>3/28/2022</a:t>
             </a:fld>
             <a:endParaRPr lang="en-US"/>
           </a:p>
@@ -1149,7 +1149,7 @@
           <p:cNvPr id="5" name="Footer Placeholder 4">
             <a:extLst>
               <a:ext uri="{FF2B5EF4-FFF2-40B4-BE49-F238E27FC236}">
-                <a16:creationId xmlns:a16="http://schemas.microsoft.com/office/drawing/2014/main" id="{BA62EE10-D047-4BD9-A3F6-DD5EBA209CA1}"/>
+                <a16:creationId xmlns:a16="http://schemas.microsoft.com/office/drawing/2014/main" xmlns="" id="{BA62EE10-D047-4BD9-A3F6-DD5EBA209CA1}"/>
               </a:ext>
             </a:extLst>
           </p:cNvPr>
@@ -1174,7 +1174,7 @@
           <p:cNvPr id="6" name="Slide Number Placeholder 5">
             <a:extLst>
               <a:ext uri="{FF2B5EF4-FFF2-40B4-BE49-F238E27FC236}">
-                <a16:creationId xmlns:a16="http://schemas.microsoft.com/office/drawing/2014/main" id="{8FCB72E2-5F2D-4C3C-A573-D36B3498BA7A}"/>
+                <a16:creationId xmlns:a16="http://schemas.microsoft.com/office/drawing/2014/main" xmlns="" id="{8FCB72E2-5F2D-4C3C-A573-D36B3498BA7A}"/>
               </a:ext>
             </a:extLst>
           </p:cNvPr>
@@ -1233,7 +1233,7 @@
           <p:cNvPr id="2" name="Title 1">
             <a:extLst>
               <a:ext uri="{FF2B5EF4-FFF2-40B4-BE49-F238E27FC236}">
-                <a16:creationId xmlns:a16="http://schemas.microsoft.com/office/drawing/2014/main" id="{61CB242F-90DA-4932-9B60-1E44AEF49484}"/>
+                <a16:creationId xmlns:a16="http://schemas.microsoft.com/office/drawing/2014/main" xmlns="" id="{61CB242F-90DA-4932-9B60-1E44AEF49484}"/>
               </a:ext>
             </a:extLst>
           </p:cNvPr>
@@ -1261,7 +1261,7 @@
           <p:cNvPr id="3" name="Content Placeholder 2">
             <a:extLst>
               <a:ext uri="{FF2B5EF4-FFF2-40B4-BE49-F238E27FC236}">
-                <a16:creationId xmlns:a16="http://schemas.microsoft.com/office/drawing/2014/main" id="{788E95E5-B64D-46CE-ACF2-6A351D5FB94D}"/>
+                <a16:creationId xmlns:a16="http://schemas.microsoft.com/office/drawing/2014/main" xmlns="" id="{788E95E5-B64D-46CE-ACF2-6A351D5FB94D}"/>
               </a:ext>
             </a:extLst>
           </p:cNvPr>
@@ -1323,7 +1323,7 @@
           <p:cNvPr id="4" name="Content Placeholder 3">
             <a:extLst>
               <a:ext uri="{FF2B5EF4-FFF2-40B4-BE49-F238E27FC236}">
-                <a16:creationId xmlns:a16="http://schemas.microsoft.com/office/drawing/2014/main" id="{59BAA6EB-4BED-4357-983D-EA104F4B060A}"/>
+                <a16:creationId xmlns:a16="http://schemas.microsoft.com/office/drawing/2014/main" xmlns="" id="{59BAA6EB-4BED-4357-983D-EA104F4B060A}"/>
               </a:ext>
             </a:extLst>
           </p:cNvPr>
@@ -1385,7 +1385,7 @@
           <p:cNvPr id="5" name="Date Placeholder 4">
             <a:extLst>
               <a:ext uri="{FF2B5EF4-FFF2-40B4-BE49-F238E27FC236}">
-                <a16:creationId xmlns:a16="http://schemas.microsoft.com/office/drawing/2014/main" id="{5A25FC22-7C76-457B-B4AA-215CA835C3E1}"/>
+                <a16:creationId xmlns:a16="http://schemas.microsoft.com/office/drawing/2014/main" xmlns="" id="{5A25FC22-7C76-457B-B4AA-215CA835C3E1}"/>
               </a:ext>
             </a:extLst>
           </p:cNvPr>
@@ -1403,7 +1403,7 @@
           <a:p>
             <a:fld id="{A3AE657A-D284-404D-960B-6B1864A84D1B}" type="datetimeFigureOut">
               <a:rPr lang="en-US" smtClean="0"/>
-              <a:t>9/30/2021</a:t>
+              <a:t>3/28/2022</a:t>
             </a:fld>
             <a:endParaRPr lang="en-US"/>
           </a:p>
@@ -1414,7 +1414,7 @@
           <p:cNvPr id="6" name="Footer Placeholder 5">
             <a:extLst>
               <a:ext uri="{FF2B5EF4-FFF2-40B4-BE49-F238E27FC236}">
-                <a16:creationId xmlns:a16="http://schemas.microsoft.com/office/drawing/2014/main" id="{F8AD7C2F-FD59-46E5-85F6-10CBA1C0F450}"/>
+                <a16:creationId xmlns:a16="http://schemas.microsoft.com/office/drawing/2014/main" xmlns="" id="{F8AD7C2F-FD59-46E5-85F6-10CBA1C0F450}"/>
               </a:ext>
             </a:extLst>
           </p:cNvPr>
@@ -1439,7 +1439,7 @@
           <p:cNvPr id="7" name="Slide Number Placeholder 6">
             <a:extLst>
               <a:ext uri="{FF2B5EF4-FFF2-40B4-BE49-F238E27FC236}">
-                <a16:creationId xmlns:a16="http://schemas.microsoft.com/office/drawing/2014/main" id="{98B3FFE0-2B60-4C11-A32E-1FCF8493AF62}"/>
+                <a16:creationId xmlns:a16="http://schemas.microsoft.com/office/drawing/2014/main" xmlns="" id="{98B3FFE0-2B60-4C11-A32E-1FCF8493AF62}"/>
               </a:ext>
             </a:extLst>
           </p:cNvPr>
@@ -1498,7 +1498,7 @@
           <p:cNvPr id="2" name="Title 1">
             <a:extLst>
               <a:ext uri="{FF2B5EF4-FFF2-40B4-BE49-F238E27FC236}">
-                <a16:creationId xmlns:a16="http://schemas.microsoft.com/office/drawing/2014/main" id="{1C78C062-392B-449C-B8CE-B5DE3D886F86}"/>
+                <a16:creationId xmlns:a16="http://schemas.microsoft.com/office/drawing/2014/main" xmlns="" id="{1C78C062-392B-449C-B8CE-B5DE3D886F86}"/>
               </a:ext>
             </a:extLst>
           </p:cNvPr>
@@ -1531,7 +1531,7 @@
           <p:cNvPr id="3" name="Text Placeholder 2">
             <a:extLst>
               <a:ext uri="{FF2B5EF4-FFF2-40B4-BE49-F238E27FC236}">
-                <a16:creationId xmlns:a16="http://schemas.microsoft.com/office/drawing/2014/main" id="{F6CD22DE-6688-42E5-983F-AB537BC15F61}"/>
+                <a16:creationId xmlns:a16="http://schemas.microsoft.com/office/drawing/2014/main" xmlns="" id="{F6CD22DE-6688-42E5-983F-AB537BC15F61}"/>
               </a:ext>
             </a:extLst>
           </p:cNvPr>
@@ -1602,7 +1602,7 @@
           <p:cNvPr id="4" name="Content Placeholder 3">
             <a:extLst>
               <a:ext uri="{FF2B5EF4-FFF2-40B4-BE49-F238E27FC236}">
-                <a16:creationId xmlns:a16="http://schemas.microsoft.com/office/drawing/2014/main" id="{EBE71AF3-41EE-4F51-8C21-BC7D3E327C8D}"/>
+                <a16:creationId xmlns:a16="http://schemas.microsoft.com/office/drawing/2014/main" xmlns="" id="{EBE71AF3-41EE-4F51-8C21-BC7D3E327C8D}"/>
               </a:ext>
             </a:extLst>
           </p:cNvPr>
@@ -1664,7 +1664,7 @@
           <p:cNvPr id="5" name="Text Placeholder 4">
             <a:extLst>
               <a:ext uri="{FF2B5EF4-FFF2-40B4-BE49-F238E27FC236}">
-                <a16:creationId xmlns:a16="http://schemas.microsoft.com/office/drawing/2014/main" id="{73B194B6-F36E-4B56-AE2D-FC9E3BE7932C}"/>
+                <a16:creationId xmlns:a16="http://schemas.microsoft.com/office/drawing/2014/main" xmlns="" id="{73B194B6-F36E-4B56-AE2D-FC9E3BE7932C}"/>
               </a:ext>
             </a:extLst>
           </p:cNvPr>
@@ -1735,7 +1735,7 @@
           <p:cNvPr id="6" name="Content Placeholder 5">
             <a:extLst>
               <a:ext uri="{FF2B5EF4-FFF2-40B4-BE49-F238E27FC236}">
-                <a16:creationId xmlns:a16="http://schemas.microsoft.com/office/drawing/2014/main" id="{B01EC941-0411-4396-BA23-9E4B19E149B4}"/>
+                <a16:creationId xmlns:a16="http://schemas.microsoft.com/office/drawing/2014/main" xmlns="" id="{B01EC941-0411-4396-BA23-9E4B19E149B4}"/>
               </a:ext>
             </a:extLst>
           </p:cNvPr>
@@ -1797,7 +1797,7 @@
           <p:cNvPr id="7" name="Date Placeholder 6">
             <a:extLst>
               <a:ext uri="{FF2B5EF4-FFF2-40B4-BE49-F238E27FC236}">
-                <a16:creationId xmlns:a16="http://schemas.microsoft.com/office/drawing/2014/main" id="{2E728EBB-506B-4F31-886B-80D8B3A550A6}"/>
+                <a16:creationId xmlns:a16="http://schemas.microsoft.com/office/drawing/2014/main" xmlns="" id="{2E728EBB-506B-4F31-886B-80D8B3A550A6}"/>
               </a:ext>
             </a:extLst>
           </p:cNvPr>
@@ -1815,7 +1815,7 @@
           <a:p>
             <a:fld id="{A3AE657A-D284-404D-960B-6B1864A84D1B}" type="datetimeFigureOut">
               <a:rPr lang="en-US" smtClean="0"/>
-              <a:t>9/30/2021</a:t>
+              <a:t>3/28/2022</a:t>
             </a:fld>
             <a:endParaRPr lang="en-US"/>
           </a:p>
@@ -1826,7 +1826,7 @@
           <p:cNvPr id="8" name="Footer Placeholder 7">
             <a:extLst>
               <a:ext uri="{FF2B5EF4-FFF2-40B4-BE49-F238E27FC236}">
-                <a16:creationId xmlns:a16="http://schemas.microsoft.com/office/drawing/2014/main" id="{B44AF1B1-CDB9-4627-9337-59449F01AC7A}"/>
+                <a16:creationId xmlns:a16="http://schemas.microsoft.com/office/drawing/2014/main" xmlns="" id="{B44AF1B1-CDB9-4627-9337-59449F01AC7A}"/>
               </a:ext>
             </a:extLst>
           </p:cNvPr>
@@ -1851,7 +1851,7 @@
           <p:cNvPr id="9" name="Slide Number Placeholder 8">
             <a:extLst>
               <a:ext uri="{FF2B5EF4-FFF2-40B4-BE49-F238E27FC236}">
-                <a16:creationId xmlns:a16="http://schemas.microsoft.com/office/drawing/2014/main" id="{9B0C9E1E-6E34-454C-9223-EA62E44F00AD}"/>
+                <a16:creationId xmlns:a16="http://schemas.microsoft.com/office/drawing/2014/main" xmlns="" id="{9B0C9E1E-6E34-454C-9223-EA62E44F00AD}"/>
               </a:ext>
             </a:extLst>
           </p:cNvPr>
@@ -1910,7 +1910,7 @@
           <p:cNvPr id="2" name="Title 1">
             <a:extLst>
               <a:ext uri="{FF2B5EF4-FFF2-40B4-BE49-F238E27FC236}">
-                <a16:creationId xmlns:a16="http://schemas.microsoft.com/office/drawing/2014/main" id="{8DA7F72A-1F12-41E4-95DD-89CB88B4CB47}"/>
+                <a16:creationId xmlns:a16="http://schemas.microsoft.com/office/drawing/2014/main" xmlns="" id="{8DA7F72A-1F12-41E4-95DD-89CB88B4CB47}"/>
               </a:ext>
             </a:extLst>
           </p:cNvPr>
@@ -1938,7 +1938,7 @@
           <p:cNvPr id="3" name="Date Placeholder 2">
             <a:extLst>
               <a:ext uri="{FF2B5EF4-FFF2-40B4-BE49-F238E27FC236}">
-                <a16:creationId xmlns:a16="http://schemas.microsoft.com/office/drawing/2014/main" id="{E1230E12-6076-49CB-9E6E-C5C642FE4793}"/>
+                <a16:creationId xmlns:a16="http://schemas.microsoft.com/office/drawing/2014/main" xmlns="" id="{E1230E12-6076-49CB-9E6E-C5C642FE4793}"/>
               </a:ext>
             </a:extLst>
           </p:cNvPr>
@@ -1956,7 +1956,7 @@
           <a:p>
             <a:fld id="{A3AE657A-D284-404D-960B-6B1864A84D1B}" type="datetimeFigureOut">
               <a:rPr lang="en-US" smtClean="0"/>
-              <a:t>9/30/2021</a:t>
+              <a:t>3/28/2022</a:t>
             </a:fld>
             <a:endParaRPr lang="en-US"/>
           </a:p>
@@ -1967,7 +1967,7 @@
           <p:cNvPr id="4" name="Footer Placeholder 3">
             <a:extLst>
               <a:ext uri="{FF2B5EF4-FFF2-40B4-BE49-F238E27FC236}">
-                <a16:creationId xmlns:a16="http://schemas.microsoft.com/office/drawing/2014/main" id="{09513BE8-E2C4-4578-AD28-62A82C5C8748}"/>
+                <a16:creationId xmlns:a16="http://schemas.microsoft.com/office/drawing/2014/main" xmlns="" id="{09513BE8-E2C4-4578-AD28-62A82C5C8748}"/>
               </a:ext>
             </a:extLst>
           </p:cNvPr>
@@ -1992,7 +1992,7 @@
           <p:cNvPr id="5" name="Slide Number Placeholder 4">
             <a:extLst>
               <a:ext uri="{FF2B5EF4-FFF2-40B4-BE49-F238E27FC236}">
-                <a16:creationId xmlns:a16="http://schemas.microsoft.com/office/drawing/2014/main" id="{488EB3D3-86DA-4F31-BDBB-695ABC949AE5}"/>
+                <a16:creationId xmlns:a16="http://schemas.microsoft.com/office/drawing/2014/main" xmlns="" id="{488EB3D3-86DA-4F31-BDBB-695ABC949AE5}"/>
               </a:ext>
             </a:extLst>
           </p:cNvPr>
@@ -2051,7 +2051,7 @@
           <p:cNvPr id="2" name="Date Placeholder 1">
             <a:extLst>
               <a:ext uri="{FF2B5EF4-FFF2-40B4-BE49-F238E27FC236}">
-                <a16:creationId xmlns:a16="http://schemas.microsoft.com/office/drawing/2014/main" id="{57F069B2-016A-4E27-86F1-362553CBFBF8}"/>
+                <a16:creationId xmlns:a16="http://schemas.microsoft.com/office/drawing/2014/main" xmlns="" id="{57F069B2-016A-4E27-86F1-362553CBFBF8}"/>
               </a:ext>
             </a:extLst>
           </p:cNvPr>
@@ -2069,7 +2069,7 @@
           <a:p>
             <a:fld id="{A3AE657A-D284-404D-960B-6B1864A84D1B}" type="datetimeFigureOut">
               <a:rPr lang="en-US" smtClean="0"/>
-              <a:t>9/30/2021</a:t>
+              <a:t>3/28/2022</a:t>
             </a:fld>
             <a:endParaRPr lang="en-US"/>
           </a:p>
@@ -2080,7 +2080,7 @@
           <p:cNvPr id="3" name="Footer Placeholder 2">
             <a:extLst>
               <a:ext uri="{FF2B5EF4-FFF2-40B4-BE49-F238E27FC236}">
-                <a16:creationId xmlns:a16="http://schemas.microsoft.com/office/drawing/2014/main" id="{791F90A9-3720-4BB0-A934-298DAE23A04B}"/>
+                <a16:creationId xmlns:a16="http://schemas.microsoft.com/office/drawing/2014/main" xmlns="" id="{791F90A9-3720-4BB0-A934-298DAE23A04B}"/>
               </a:ext>
             </a:extLst>
           </p:cNvPr>
@@ -2105,7 +2105,7 @@
           <p:cNvPr id="4" name="Slide Number Placeholder 3">
             <a:extLst>
               <a:ext uri="{FF2B5EF4-FFF2-40B4-BE49-F238E27FC236}">
-                <a16:creationId xmlns:a16="http://schemas.microsoft.com/office/drawing/2014/main" id="{664794EF-DBBD-482B-A780-21502550ABE7}"/>
+                <a16:creationId xmlns:a16="http://schemas.microsoft.com/office/drawing/2014/main" xmlns="" id="{664794EF-DBBD-482B-A780-21502550ABE7}"/>
               </a:ext>
             </a:extLst>
           </p:cNvPr>
@@ -2164,7 +2164,7 @@
           <p:cNvPr id="2" name="Title 1">
             <a:extLst>
               <a:ext uri="{FF2B5EF4-FFF2-40B4-BE49-F238E27FC236}">
-                <a16:creationId xmlns:a16="http://schemas.microsoft.com/office/drawing/2014/main" id="{6D0CC981-BC2A-4566-BA54-B1FACDCAF48D}"/>
+                <a16:creationId xmlns:a16="http://schemas.microsoft.com/office/drawing/2014/main" xmlns="" id="{6D0CC981-BC2A-4566-BA54-B1FACDCAF48D}"/>
               </a:ext>
             </a:extLst>
           </p:cNvPr>
@@ -2201,7 +2201,7 @@
           <p:cNvPr id="3" name="Content Placeholder 2">
             <a:extLst>
               <a:ext uri="{FF2B5EF4-FFF2-40B4-BE49-F238E27FC236}">
-                <a16:creationId xmlns:a16="http://schemas.microsoft.com/office/drawing/2014/main" id="{CF32CEED-D1F1-4801-84AD-CB77A51AB429}"/>
+                <a16:creationId xmlns:a16="http://schemas.microsoft.com/office/drawing/2014/main" xmlns="" id="{CF32CEED-D1F1-4801-84AD-CB77A51AB429}"/>
               </a:ext>
             </a:extLst>
           </p:cNvPr>
@@ -2291,7 +2291,7 @@
           <p:cNvPr id="4" name="Text Placeholder 3">
             <a:extLst>
               <a:ext uri="{FF2B5EF4-FFF2-40B4-BE49-F238E27FC236}">
-                <a16:creationId xmlns:a16="http://schemas.microsoft.com/office/drawing/2014/main" id="{81C6CE86-C87A-4620-91E1-94FBE4804063}"/>
+                <a16:creationId xmlns:a16="http://schemas.microsoft.com/office/drawing/2014/main" xmlns="" id="{81C6CE86-C87A-4620-91E1-94FBE4804063}"/>
               </a:ext>
             </a:extLst>
           </p:cNvPr>
@@ -2362,7 +2362,7 @@
           <p:cNvPr id="5" name="Date Placeholder 4">
             <a:extLst>
               <a:ext uri="{FF2B5EF4-FFF2-40B4-BE49-F238E27FC236}">
-                <a16:creationId xmlns:a16="http://schemas.microsoft.com/office/drawing/2014/main" id="{84A81CCF-6073-4981-805E-B970CA8EAB70}"/>
+                <a16:creationId xmlns:a16="http://schemas.microsoft.com/office/drawing/2014/main" xmlns="" id="{84A81CCF-6073-4981-805E-B970CA8EAB70}"/>
               </a:ext>
             </a:extLst>
           </p:cNvPr>
@@ -2380,7 +2380,7 @@
           <a:p>
             <a:fld id="{A3AE657A-D284-404D-960B-6B1864A84D1B}" type="datetimeFigureOut">
               <a:rPr lang="en-US" smtClean="0"/>
-              <a:t>9/30/2021</a:t>
+              <a:t>3/28/2022</a:t>
             </a:fld>
             <a:endParaRPr lang="en-US"/>
           </a:p>
@@ -2391,7 +2391,7 @@
           <p:cNvPr id="6" name="Footer Placeholder 5">
             <a:extLst>
               <a:ext uri="{FF2B5EF4-FFF2-40B4-BE49-F238E27FC236}">
-                <a16:creationId xmlns:a16="http://schemas.microsoft.com/office/drawing/2014/main" id="{FE1F0BBE-5758-4FEB-B74D-E83097EF1A0E}"/>
+                <a16:creationId xmlns:a16="http://schemas.microsoft.com/office/drawing/2014/main" xmlns="" id="{FE1F0BBE-5758-4FEB-B74D-E83097EF1A0E}"/>
               </a:ext>
             </a:extLst>
           </p:cNvPr>
@@ -2416,7 +2416,7 @@
           <p:cNvPr id="7" name="Slide Number Placeholder 6">
             <a:extLst>
               <a:ext uri="{FF2B5EF4-FFF2-40B4-BE49-F238E27FC236}">
-                <a16:creationId xmlns:a16="http://schemas.microsoft.com/office/drawing/2014/main" id="{2DD8899B-B015-4679-B980-75A6FE60E7C1}"/>
+                <a16:creationId xmlns:a16="http://schemas.microsoft.com/office/drawing/2014/main" xmlns="" id="{2DD8899B-B015-4679-B980-75A6FE60E7C1}"/>
               </a:ext>
             </a:extLst>
           </p:cNvPr>
@@ -2475,7 +2475,7 @@
           <p:cNvPr id="2" name="Title 1">
             <a:extLst>
               <a:ext uri="{FF2B5EF4-FFF2-40B4-BE49-F238E27FC236}">
-                <a16:creationId xmlns:a16="http://schemas.microsoft.com/office/drawing/2014/main" id="{8B4C2EBA-5FFF-4E97-9A88-E605A6524D13}"/>
+                <a16:creationId xmlns:a16="http://schemas.microsoft.com/office/drawing/2014/main" xmlns="" id="{8B4C2EBA-5FFF-4E97-9A88-E605A6524D13}"/>
               </a:ext>
             </a:extLst>
           </p:cNvPr>
@@ -2512,7 +2512,7 @@
           <p:cNvPr id="3" name="Picture Placeholder 2">
             <a:extLst>
               <a:ext uri="{FF2B5EF4-FFF2-40B4-BE49-F238E27FC236}">
-                <a16:creationId xmlns:a16="http://schemas.microsoft.com/office/drawing/2014/main" id="{4BEEE40D-DDC8-4194-95AE-3F8428D2A75E}"/>
+                <a16:creationId xmlns:a16="http://schemas.microsoft.com/office/drawing/2014/main" xmlns="" id="{4BEEE40D-DDC8-4194-95AE-3F8428D2A75E}"/>
               </a:ext>
             </a:extLst>
           </p:cNvPr>
@@ -2579,7 +2579,7 @@
           <p:cNvPr id="4" name="Text Placeholder 3">
             <a:extLst>
               <a:ext uri="{FF2B5EF4-FFF2-40B4-BE49-F238E27FC236}">
-                <a16:creationId xmlns:a16="http://schemas.microsoft.com/office/drawing/2014/main" id="{41A49CA5-9F13-48B1-AD08-99DB2DE25458}"/>
+                <a16:creationId xmlns:a16="http://schemas.microsoft.com/office/drawing/2014/main" xmlns="" id="{41A49CA5-9F13-48B1-AD08-99DB2DE25458}"/>
               </a:ext>
             </a:extLst>
           </p:cNvPr>
@@ -2650,7 +2650,7 @@
           <p:cNvPr id="5" name="Date Placeholder 4">
             <a:extLst>
               <a:ext uri="{FF2B5EF4-FFF2-40B4-BE49-F238E27FC236}">
-                <a16:creationId xmlns:a16="http://schemas.microsoft.com/office/drawing/2014/main" id="{17763D3E-C535-4B90-814D-77964803AC10}"/>
+                <a16:creationId xmlns:a16="http://schemas.microsoft.com/office/drawing/2014/main" xmlns="" id="{17763D3E-C535-4B90-814D-77964803AC10}"/>
               </a:ext>
             </a:extLst>
           </p:cNvPr>
@@ -2668,7 +2668,7 @@
           <a:p>
             <a:fld id="{A3AE657A-D284-404D-960B-6B1864A84D1B}" type="datetimeFigureOut">
               <a:rPr lang="en-US" smtClean="0"/>
-              <a:t>9/30/2021</a:t>
+              <a:t>3/28/2022</a:t>
             </a:fld>
             <a:endParaRPr lang="en-US"/>
           </a:p>
@@ -2679,7 +2679,7 @@
           <p:cNvPr id="6" name="Footer Placeholder 5">
             <a:extLst>
               <a:ext uri="{FF2B5EF4-FFF2-40B4-BE49-F238E27FC236}">
-                <a16:creationId xmlns:a16="http://schemas.microsoft.com/office/drawing/2014/main" id="{7E4472C7-A0B9-48B6-AECC-45F7EF14EFE4}"/>
+                <a16:creationId xmlns:a16="http://schemas.microsoft.com/office/drawing/2014/main" xmlns="" id="{7E4472C7-A0B9-48B6-AECC-45F7EF14EFE4}"/>
               </a:ext>
             </a:extLst>
           </p:cNvPr>
@@ -2704,7 +2704,7 @@
           <p:cNvPr id="7" name="Slide Number Placeholder 6">
             <a:extLst>
               <a:ext uri="{FF2B5EF4-FFF2-40B4-BE49-F238E27FC236}">
-                <a16:creationId xmlns:a16="http://schemas.microsoft.com/office/drawing/2014/main" id="{E9C83EB5-6CC3-45AD-A266-794B610EEE1C}"/>
+                <a16:creationId xmlns:a16="http://schemas.microsoft.com/office/drawing/2014/main" xmlns="" id="{E9C83EB5-6CC3-45AD-A266-794B610EEE1C}"/>
               </a:ext>
             </a:extLst>
           </p:cNvPr>
@@ -2768,7 +2768,7 @@
           <p:cNvPr id="2" name="Title Placeholder 1">
             <a:extLst>
               <a:ext uri="{FF2B5EF4-FFF2-40B4-BE49-F238E27FC236}">
-                <a16:creationId xmlns:a16="http://schemas.microsoft.com/office/drawing/2014/main" id="{FC07EE6F-80F7-498F-8FC8-766087863C96}"/>
+                <a16:creationId xmlns:a16="http://schemas.microsoft.com/office/drawing/2014/main" xmlns="" id="{FC07EE6F-80F7-498F-8FC8-766087863C96}"/>
               </a:ext>
             </a:extLst>
           </p:cNvPr>
@@ -2806,7 +2806,7 @@
           <p:cNvPr id="3" name="Text Placeholder 2">
             <a:extLst>
               <a:ext uri="{FF2B5EF4-FFF2-40B4-BE49-F238E27FC236}">
-                <a16:creationId xmlns:a16="http://schemas.microsoft.com/office/drawing/2014/main" id="{78F0F1D2-23C3-432E-BF86-FE9C26EB9A3E}"/>
+                <a16:creationId xmlns:a16="http://schemas.microsoft.com/office/drawing/2014/main" xmlns="" id="{78F0F1D2-23C3-432E-BF86-FE9C26EB9A3E}"/>
               </a:ext>
             </a:extLst>
           </p:cNvPr>
@@ -2873,7 +2873,7 @@
           <p:cNvPr id="4" name="Date Placeholder 3">
             <a:extLst>
               <a:ext uri="{FF2B5EF4-FFF2-40B4-BE49-F238E27FC236}">
-                <a16:creationId xmlns:a16="http://schemas.microsoft.com/office/drawing/2014/main" id="{45FBC486-1BCB-4B13-9054-B2C57F6EE911}"/>
+                <a16:creationId xmlns:a16="http://schemas.microsoft.com/office/drawing/2014/main" xmlns="" id="{45FBC486-1BCB-4B13-9054-B2C57F6EE911}"/>
               </a:ext>
             </a:extLst>
           </p:cNvPr>
@@ -2909,7 +2909,7 @@
           <a:p>
             <a:fld id="{A3AE657A-D284-404D-960B-6B1864A84D1B}" type="datetimeFigureOut">
               <a:rPr lang="en-US" smtClean="0"/>
-              <a:t>9/30/2021</a:t>
+              <a:t>3/28/2022</a:t>
             </a:fld>
             <a:endParaRPr lang="en-US"/>
           </a:p>
@@ -2920,7 +2920,7 @@
           <p:cNvPr id="5" name="Footer Placeholder 4">
             <a:extLst>
               <a:ext uri="{FF2B5EF4-FFF2-40B4-BE49-F238E27FC236}">
-                <a16:creationId xmlns:a16="http://schemas.microsoft.com/office/drawing/2014/main" id="{3B8AAE3E-84DF-43F6-902B-A5E732AF278A}"/>
+                <a16:creationId xmlns:a16="http://schemas.microsoft.com/office/drawing/2014/main" xmlns="" id="{3B8AAE3E-84DF-43F6-902B-A5E732AF278A}"/>
               </a:ext>
             </a:extLst>
           </p:cNvPr>
@@ -2963,7 +2963,7 @@
           <p:cNvPr id="6" name="Slide Number Placeholder 5">
             <a:extLst>
               <a:ext uri="{FF2B5EF4-FFF2-40B4-BE49-F238E27FC236}">
-                <a16:creationId xmlns:a16="http://schemas.microsoft.com/office/drawing/2014/main" id="{7579D16B-435A-46BA-B9D4-735DD6980E26}"/>
+                <a16:creationId xmlns:a16="http://schemas.microsoft.com/office/drawing/2014/main" xmlns="" id="{7579D16B-435A-46BA-B9D4-735DD6980E26}"/>
               </a:ext>
             </a:extLst>
           </p:cNvPr>
@@ -3328,10 +3328,10 @@
       </p:grpSpPr>
       <p:sp>
         <p:nvSpPr>
-          <p:cNvPr id="4" name="Rounded Rectangle 60">
-            <a:extLst>
-              <a:ext uri="{FF2B5EF4-FFF2-40B4-BE49-F238E27FC236}">
-                <a16:creationId xmlns:a16="http://schemas.microsoft.com/office/drawing/2014/main" id="{237A6621-EDB6-4188-8573-7B8B8746FFD7}"/>
+          <p:cNvPr id="65" name="Rounded Rectangle 60">
+            <a:extLst>
+              <a:ext uri="{FF2B5EF4-FFF2-40B4-BE49-F238E27FC236}">
+                <a16:creationId xmlns:a16="http://schemas.microsoft.com/office/drawing/2014/main" xmlns="" id="{237A6621-EDB6-4188-8573-7B8B8746FFD7}"/>
               </a:ext>
             </a:extLst>
           </p:cNvPr>
@@ -3340,8 +3340,8 @@
         </p:nvSpPr>
         <p:spPr>
           <a:xfrm>
-            <a:off x="479375" y="764729"/>
-            <a:ext cx="8563025" cy="4269089"/>
+            <a:off x="1415480" y="1268760"/>
+            <a:ext cx="5226414" cy="3817892"/>
           </a:xfrm>
           <a:prstGeom prst="roundRect">
             <a:avLst>
@@ -3349,57 +3349,66 @@
             </a:avLst>
           </a:prstGeom>
           <a:solidFill>
-            <a:schemeClr val="bg1">
+            <a:srgbClr val="FFFFFF">
               <a:lumMod val="95000"/>
-            </a:schemeClr>
+            </a:srgbClr>
           </a:solidFill>
-          <a:ln w="12700">
+          <a:ln w="12700" cap="flat" cmpd="sng" algn="ctr">
             <a:solidFill>
-              <a:schemeClr val="bg2"/>
+              <a:srgbClr val="CBD3D7"/>
             </a:solidFill>
+            <a:prstDash val="solid"/>
           </a:ln>
+          <a:effectLst/>
         </p:spPr>
-        <p:style>
-          <a:lnRef idx="2">
-            <a:schemeClr val="accent1">
-              <a:shade val="50000"/>
-            </a:schemeClr>
-          </a:lnRef>
-          <a:fillRef idx="1">
-            <a:schemeClr val="accent1"/>
-          </a:fillRef>
-          <a:effectRef idx="0">
-            <a:schemeClr val="accent1"/>
-          </a:effectRef>
-          <a:fontRef idx="minor">
-            <a:schemeClr val="lt1"/>
-          </a:fontRef>
-        </p:style>
         <p:txBody>
           <a:bodyPr rtlCol="0" anchor="ctr"/>
           <a:lstStyle/>
           <a:p>
-            <a:pPr algn="ctr"/>
-            <a:endParaRPr lang="en-US" dirty="0"/>
-          </a:p>
-        </p:txBody>
-      </p:sp>
-      <p:sp>
-        <p:nvSpPr>
-          <p:cNvPr id="11" name="Rounded Rectangle 60">
-            <a:extLst>
-              <a:ext uri="{FF2B5EF4-FFF2-40B4-BE49-F238E27FC236}">
-                <a16:creationId xmlns:a16="http://schemas.microsoft.com/office/drawing/2014/main" id="{0A94FFDB-CB7C-47BF-BF89-32A40300ACBF}"/>
-              </a:ext>
-            </a:extLst>
-          </p:cNvPr>
+            <a:pPr marL="0" marR="0" lvl="0" indent="0" defTabSz="914377" eaLnBrk="1" fontAlgn="auto" latinLnBrk="0" hangingPunct="1">
+              <a:lnSpc>
+                <a:spcPct val="100000"/>
+              </a:lnSpc>
+              <a:spcBef>
+                <a:spcPts val="0"/>
+              </a:spcBef>
+              <a:spcAft>
+                <a:spcPts val="0"/>
+              </a:spcAft>
+              <a:buClrTx/>
+              <a:buSzTx/>
+              <a:buFontTx/>
+              <a:buNone/>
+              <a:tabLst/>
+              <a:defRPr/>
+            </a:pPr>
+            <a:endParaRPr kumimoji="0" lang="en-US" sz="1800" b="0" i="0" u="none" strike="noStrike" kern="0" cap="none" spc="0" normalizeH="0" baseline="0" noProof="0" dirty="0" smtClean="0">
+              <a:ln>
+                <a:noFill/>
+              </a:ln>
+              <a:solidFill>
+                <a:srgbClr val="FFFFFF"/>
+              </a:solidFill>
+              <a:effectLst/>
+              <a:uLnTx/>
+              <a:uFillTx/>
+              <a:latin typeface="Source Sans Pro" charset="0"/>
+              <a:ea typeface="Source Sans Pro" charset="0"/>
+              <a:cs typeface="Source Sans Pro" charset="0"/>
+            </a:endParaRPr>
+          </a:p>
+        </p:txBody>
+      </p:sp>
+      <p:sp>
+        <p:nvSpPr>
+          <p:cNvPr id="66" name="Rounded Rectangle 65"/>
           <p:cNvSpPr/>
           <p:nvPr/>
         </p:nvSpPr>
         <p:spPr>
           <a:xfrm>
-            <a:off x="1293088" y="917526"/>
-            <a:ext cx="3343564" cy="3950038"/>
+            <a:off x="6961465" y="1532318"/>
+            <a:ext cx="2460363" cy="873926"/>
           </a:xfrm>
           <a:prstGeom prst="roundRect">
             <a:avLst>
@@ -3407,70 +3416,757 @@
             </a:avLst>
           </a:prstGeom>
           <a:solidFill>
-            <a:schemeClr val="bg1">
+            <a:srgbClr val="FFFFFF"/>
+          </a:solidFill>
+          <a:ln w="12700" cap="flat" cmpd="sng" algn="ctr">
+            <a:solidFill>
+              <a:srgbClr val="CBD3D7"/>
+            </a:solidFill>
+            <a:prstDash val="solid"/>
+          </a:ln>
+          <a:effectLst/>
+        </p:spPr>
+        <p:txBody>
+          <a:bodyPr rtlCol="0" anchor="ctr"/>
+          <a:lstStyle/>
+          <a:p>
+            <a:pPr marL="0" marR="0" lvl="0" indent="0" algn="ctr" defTabSz="914377" eaLnBrk="1" fontAlgn="auto" latinLnBrk="0" hangingPunct="1">
+              <a:lnSpc>
+                <a:spcPct val="100000"/>
+              </a:lnSpc>
+              <a:spcBef>
+                <a:spcPts val="0"/>
+              </a:spcBef>
+              <a:spcAft>
+                <a:spcPts val="0"/>
+              </a:spcAft>
+              <a:buClrTx/>
+              <a:buSzTx/>
+              <a:buFontTx/>
+              <a:buNone/>
+              <a:tabLst/>
+              <a:defRPr/>
+            </a:pPr>
+            <a:r>
+              <a:rPr kumimoji="0" lang="en-US" sz="1800" b="0" i="0" u="none" strike="noStrike" kern="0" cap="none" spc="0" normalizeH="0" baseline="0" noProof="0" smtClean="0">
+                <a:ln>
+                  <a:noFill/>
+                </a:ln>
+                <a:solidFill>
+                  <a:srgbClr val="FFFFFF"/>
+                </a:solidFill>
+                <a:effectLst/>
+                <a:uLnTx/>
+                <a:uFillTx/>
+                <a:latin typeface="Calibri" panose="020F0502020204030204"/>
+                <a:ea typeface="+mn-ea"/>
+                <a:cs typeface="+mn-cs"/>
+              </a:rPr>
+              <a:t>vz</a:t>
+            </a:r>
+            <a:endParaRPr kumimoji="0" lang="en-US" sz="1800" b="0" i="0" u="none" strike="noStrike" kern="0" cap="none" spc="0" normalizeH="0" baseline="0" noProof="0" dirty="0" smtClean="0">
+              <a:ln>
+                <a:noFill/>
+              </a:ln>
+              <a:solidFill>
+                <a:srgbClr val="FFFFFF"/>
+              </a:solidFill>
+              <a:effectLst/>
+              <a:uLnTx/>
+              <a:uFillTx/>
+              <a:latin typeface="Calibri" panose="020F0502020204030204"/>
+              <a:ea typeface="+mn-ea"/>
+              <a:cs typeface="+mn-cs"/>
+            </a:endParaRPr>
+          </a:p>
+        </p:txBody>
+      </p:sp>
+      <p:sp>
+        <p:nvSpPr>
+          <p:cNvPr id="67" name="Rounded Rectangle 66"/>
+          <p:cNvSpPr/>
+          <p:nvPr/>
+        </p:nvSpPr>
+        <p:spPr>
+          <a:xfrm>
+            <a:off x="4214732" y="2719268"/>
+            <a:ext cx="2250756" cy="2149892"/>
+          </a:xfrm>
+          <a:prstGeom prst="roundRect">
+            <a:avLst>
+              <a:gd name="adj" fmla="val 11341"/>
+            </a:avLst>
+          </a:prstGeom>
+          <a:solidFill>
+            <a:srgbClr val="FFFFFF">
               <a:lumMod val="85000"/>
-            </a:schemeClr>
+            </a:srgbClr>
           </a:solidFill>
-          <a:ln w="12700">
+          <a:ln w="12700" cap="flat" cmpd="sng" algn="ctr">
             <a:solidFill>
-              <a:schemeClr val="bg2"/>
+              <a:srgbClr val="CBD3D7"/>
             </a:solidFill>
+            <a:prstDash val="solid"/>
           </a:ln>
+          <a:effectLst/>
         </p:spPr>
-        <p:style>
-          <a:lnRef idx="2">
-            <a:schemeClr val="accent1">
-              <a:shade val="50000"/>
-            </a:schemeClr>
-          </a:lnRef>
-          <a:fillRef idx="1">
-            <a:schemeClr val="accent1"/>
-          </a:fillRef>
-          <a:effectRef idx="0">
-            <a:schemeClr val="accent1"/>
-          </a:effectRef>
-          <a:fontRef idx="minor">
-            <a:schemeClr val="lt1"/>
-          </a:fontRef>
-        </p:style>
         <p:txBody>
           <a:bodyPr rtlCol="0" anchor="ctr"/>
           <a:lstStyle/>
           <a:p>
-            <a:pPr algn="ctr"/>
-            <a:endParaRPr lang="en-US" dirty="0"/>
+            <a:pPr marL="0" marR="0" lvl="0" indent="0" algn="ctr" defTabSz="914400" eaLnBrk="1" fontAlgn="auto" latinLnBrk="0" hangingPunct="1">
+              <a:lnSpc>
+                <a:spcPct val="100000"/>
+              </a:lnSpc>
+              <a:spcBef>
+                <a:spcPts val="0"/>
+              </a:spcBef>
+              <a:spcAft>
+                <a:spcPts val="0"/>
+              </a:spcAft>
+              <a:buClrTx/>
+              <a:buSzTx/>
+              <a:buFontTx/>
+              <a:buNone/>
+              <a:tabLst/>
+              <a:defRPr/>
+            </a:pPr>
+            <a:endParaRPr kumimoji="0" lang="en-US" sz="1800" b="0" i="0" u="none" strike="noStrike" kern="0" cap="none" spc="0" normalizeH="0" baseline="0" noProof="0" dirty="0" smtClean="0">
+              <a:ln>
+                <a:noFill/>
+              </a:ln>
+              <a:solidFill>
+                <a:srgbClr val="FFFFFF"/>
+              </a:solidFill>
+              <a:effectLst/>
+              <a:uLnTx/>
+              <a:uFillTx/>
+              <a:latin typeface="Calibri" panose="020F0502020204030204"/>
+              <a:ea typeface="+mn-ea"/>
+              <a:cs typeface="+mn-cs"/>
+            </a:endParaRPr>
+          </a:p>
+        </p:txBody>
+      </p:sp>
+      <p:sp>
+        <p:nvSpPr>
+          <p:cNvPr id="68" name="Rounded Rectangle 67"/>
+          <p:cNvSpPr/>
+          <p:nvPr/>
+        </p:nvSpPr>
+        <p:spPr>
+          <a:xfrm>
+            <a:off x="6866417" y="4061535"/>
+            <a:ext cx="2439630" cy="810581"/>
+          </a:xfrm>
+          <a:prstGeom prst="roundRect">
+            <a:avLst>
+              <a:gd name="adj" fmla="val 15733"/>
+            </a:avLst>
+          </a:prstGeom>
+          <a:solidFill>
+            <a:srgbClr val="FFFFFF"/>
+          </a:solidFill>
+          <a:ln w="12700" cap="flat" cmpd="sng" algn="ctr">
+            <a:solidFill>
+              <a:srgbClr val="CBD3D7"/>
+            </a:solidFill>
+            <a:prstDash val="solid"/>
+          </a:ln>
+          <a:effectLst/>
+        </p:spPr>
+        <p:txBody>
+          <a:bodyPr rtlCol="0" anchor="ctr"/>
+          <a:lstStyle/>
+          <a:p>
+            <a:pPr marL="0" marR="0" lvl="0" indent="0" algn="ctr" defTabSz="914377" eaLnBrk="1" fontAlgn="auto" latinLnBrk="0" hangingPunct="1">
+              <a:lnSpc>
+                <a:spcPct val="100000"/>
+              </a:lnSpc>
+              <a:spcBef>
+                <a:spcPts val="0"/>
+              </a:spcBef>
+              <a:spcAft>
+                <a:spcPts val="0"/>
+              </a:spcAft>
+              <a:buClrTx/>
+              <a:buSzTx/>
+              <a:buFontTx/>
+              <a:buNone/>
+              <a:tabLst/>
+              <a:defRPr/>
+            </a:pPr>
+            <a:endParaRPr kumimoji="0" lang="en-US" sz="1800" b="0" i="0" u="none" strike="noStrike" kern="0" cap="none" spc="0" normalizeH="0" baseline="0" noProof="0" dirty="0" smtClean="0">
+              <a:ln>
+                <a:noFill/>
+              </a:ln>
+              <a:solidFill>
+                <a:srgbClr val="FFFFFF"/>
+              </a:solidFill>
+              <a:effectLst/>
+              <a:uLnTx/>
+              <a:uFillTx/>
+              <a:latin typeface="Calibri" panose="020F0502020204030204"/>
+              <a:ea typeface="+mn-ea"/>
+              <a:cs typeface="+mn-cs"/>
+            </a:endParaRPr>
+          </a:p>
+        </p:txBody>
+      </p:sp>
+      <p:sp>
+        <p:nvSpPr>
+          <p:cNvPr id="69" name="Rounded Rectangle 68"/>
+          <p:cNvSpPr/>
+          <p:nvPr/>
+        </p:nvSpPr>
+        <p:spPr>
+          <a:xfrm>
+            <a:off x="6892257" y="2844607"/>
+            <a:ext cx="2435650" cy="853748"/>
+          </a:xfrm>
+          <a:prstGeom prst="roundRect">
+            <a:avLst>
+              <a:gd name="adj" fmla="val 15733"/>
+            </a:avLst>
+          </a:prstGeom>
+          <a:solidFill>
+            <a:srgbClr val="FFFFFF"/>
+          </a:solidFill>
+          <a:ln w="12700" cap="flat" cmpd="sng" algn="ctr">
+            <a:solidFill>
+              <a:srgbClr val="CBD3D7"/>
+            </a:solidFill>
+            <a:prstDash val="solid"/>
+          </a:ln>
+          <a:effectLst/>
+        </p:spPr>
+        <p:txBody>
+          <a:bodyPr rtlCol="0" anchor="ctr"/>
+          <a:lstStyle/>
+          <a:p>
+            <a:pPr marL="0" marR="0" lvl="0" indent="0" algn="ctr" defTabSz="914377" eaLnBrk="1" fontAlgn="auto" latinLnBrk="0" hangingPunct="1">
+              <a:lnSpc>
+                <a:spcPct val="100000"/>
+              </a:lnSpc>
+              <a:spcBef>
+                <a:spcPts val="0"/>
+              </a:spcBef>
+              <a:spcAft>
+                <a:spcPts val="0"/>
+              </a:spcAft>
+              <a:buClrTx/>
+              <a:buSzTx/>
+              <a:buFontTx/>
+              <a:buNone/>
+              <a:tabLst/>
+              <a:defRPr/>
+            </a:pPr>
+            <a:r>
+              <a:rPr kumimoji="0" lang="en-US" sz="1800" b="0" i="0" u="none" strike="noStrike" kern="0" cap="none" spc="0" normalizeH="0" baseline="0" noProof="0" smtClean="0">
+                <a:ln>
+                  <a:noFill/>
+                </a:ln>
+                <a:solidFill>
+                  <a:srgbClr val="FFFFFF"/>
+                </a:solidFill>
+                <a:effectLst/>
+                <a:uLnTx/>
+                <a:uFillTx/>
+                <a:latin typeface="Calibri" panose="020F0502020204030204"/>
+                <a:ea typeface="+mn-ea"/>
+                <a:cs typeface="+mn-cs"/>
+              </a:rPr>
+              <a:t>vz</a:t>
+            </a:r>
+            <a:endParaRPr kumimoji="0" lang="en-US" sz="1800" b="0" i="0" u="none" strike="noStrike" kern="0" cap="none" spc="0" normalizeH="0" baseline="0" noProof="0" dirty="0" smtClean="0">
+              <a:ln>
+                <a:noFill/>
+              </a:ln>
+              <a:solidFill>
+                <a:srgbClr val="FFFFFF"/>
+              </a:solidFill>
+              <a:effectLst/>
+              <a:uLnTx/>
+              <a:uFillTx/>
+              <a:latin typeface="Calibri" panose="020F0502020204030204"/>
+              <a:ea typeface="+mn-ea"/>
+              <a:cs typeface="+mn-cs"/>
+            </a:endParaRPr>
+          </a:p>
+        </p:txBody>
+      </p:sp>
+      <p:sp>
+        <p:nvSpPr>
+          <p:cNvPr id="70" name="TextBox 69"/>
+          <p:cNvSpPr txBox="1"/>
+          <p:nvPr/>
+        </p:nvSpPr>
+        <p:spPr>
+          <a:xfrm>
+            <a:off x="6961465" y="1607973"/>
+            <a:ext cx="1931600" cy="307777"/>
+          </a:xfrm>
+          <a:prstGeom prst="rect">
+            <a:avLst/>
+          </a:prstGeom>
+          <a:noFill/>
+        </p:spPr>
+        <p:txBody>
+          <a:bodyPr wrap="square" rtlCol="0">
+            <a:spAutoFit/>
+          </a:bodyPr>
+          <a:lstStyle/>
+          <a:p>
+            <a:pPr defTabSz="914377"/>
+            <a:r>
+              <a:rPr lang="en-US" sz="1400" b="1" dirty="0" smtClean="0">
+                <a:solidFill>
+                  <a:srgbClr val="4B5357"/>
+                </a:solidFill>
+                <a:latin typeface="Source Sans Pro" charset="0"/>
+                <a:ea typeface="Source Sans Pro" charset="0"/>
+                <a:cs typeface="Source Sans Pro" charset="0"/>
+              </a:rPr>
+              <a:t>Central Repository</a:t>
+            </a:r>
+            <a:endParaRPr lang="en-US" sz="1400" b="1" dirty="0">
+              <a:solidFill>
+                <a:srgbClr val="4B5357"/>
+              </a:solidFill>
+              <a:latin typeface="Source Sans Pro" charset="0"/>
+              <a:ea typeface="Source Sans Pro" charset="0"/>
+              <a:cs typeface="Source Sans Pro" charset="0"/>
+            </a:endParaRPr>
+          </a:p>
+        </p:txBody>
+      </p:sp>
+      <p:sp>
+        <p:nvSpPr>
+          <p:cNvPr id="71" name="TextBox 70"/>
+          <p:cNvSpPr txBox="1"/>
+          <p:nvPr/>
+        </p:nvSpPr>
+        <p:spPr>
+          <a:xfrm>
+            <a:off x="6934146" y="2952215"/>
+            <a:ext cx="1909130" cy="307777"/>
+          </a:xfrm>
+          <a:prstGeom prst="rect">
+            <a:avLst/>
+          </a:prstGeom>
+          <a:noFill/>
+        </p:spPr>
+        <p:txBody>
+          <a:bodyPr wrap="square" rtlCol="0">
+            <a:spAutoFit/>
+          </a:bodyPr>
+          <a:lstStyle/>
+          <a:p>
+            <a:pPr defTabSz="914377"/>
+            <a:r>
+              <a:rPr lang="en-US" sz="1400" b="1" dirty="0" smtClean="0">
+                <a:solidFill>
+                  <a:srgbClr val="4B5357"/>
+                </a:solidFill>
+                <a:latin typeface="Source Sans Pro" charset="0"/>
+                <a:ea typeface="Source Sans Pro" charset="0"/>
+                <a:cs typeface="Source Sans Pro" charset="0"/>
+              </a:rPr>
+              <a:t>Developer Repository</a:t>
+            </a:r>
+            <a:endParaRPr lang="en-US" sz="1400" b="1" dirty="0">
+              <a:solidFill>
+                <a:srgbClr val="4B5357"/>
+              </a:solidFill>
+              <a:latin typeface="Source Sans Pro" charset="0"/>
+              <a:ea typeface="Source Sans Pro" charset="0"/>
+              <a:cs typeface="Source Sans Pro" charset="0"/>
+            </a:endParaRPr>
           </a:p>
         </p:txBody>
       </p:sp>
       <p:pic>
         <p:nvPicPr>
-          <p:cNvPr id="6" name="Picture 5">
-            <a:extLst>
-              <a:ext uri="{FF2B5EF4-FFF2-40B4-BE49-F238E27FC236}">
-                <a16:creationId xmlns:a16="http://schemas.microsoft.com/office/drawing/2014/main" id="{FB37C0F5-0297-4195-9258-4EFC2D571DE8}"/>
-              </a:ext>
-            </a:extLst>
-          </p:cNvPr>
+          <p:cNvPr id="72" name="Picture 71"/>
           <p:cNvPicPr>
             <a:picLocks noChangeAspect="1"/>
           </p:cNvPicPr>
           <p:nvPr/>
         </p:nvPicPr>
-        <p:blipFill rotWithShape="1">
-          <a:blip r:embed="rId2">
-            <a:extLst>
-              <a:ext uri="{28A0092B-C50C-407E-A947-70E740481C1C}">
-                <a14:useLocalDpi xmlns:a14="http://schemas.microsoft.com/office/drawing/2010/main" val="0"/>
-              </a:ext>
-            </a:extLst>
-          </a:blip>
-          <a:srcRect t="82169" b="2041"/>
-          <a:stretch/>
+        <p:blipFill>
+          <a:blip r:embed="rId2"/>
+          <a:stretch>
+            <a:fillRect/>
+          </a:stretch>
         </p:blipFill>
         <p:spPr>
           <a:xfrm>
-            <a:off x="1920112" y="1108377"/>
-            <a:ext cx="2077911" cy="306900"/>
+            <a:off x="8821416" y="4152036"/>
+            <a:ext cx="356260" cy="356260"/>
+          </a:xfrm>
+          <a:prstGeom prst="rect">
+            <a:avLst/>
+          </a:prstGeom>
+        </p:spPr>
+      </p:pic>
+      <p:sp>
+        <p:nvSpPr>
+          <p:cNvPr id="73" name="TextBox 72"/>
+          <p:cNvSpPr txBox="1"/>
+          <p:nvPr/>
+        </p:nvSpPr>
+        <p:spPr>
+          <a:xfrm>
+            <a:off x="6891801" y="4176277"/>
+            <a:ext cx="1783362" cy="307777"/>
+          </a:xfrm>
+          <a:prstGeom prst="rect">
+            <a:avLst/>
+          </a:prstGeom>
+          <a:noFill/>
+        </p:spPr>
+        <p:txBody>
+          <a:bodyPr wrap="square" rtlCol="0">
+            <a:spAutoFit/>
+          </a:bodyPr>
+          <a:lstStyle/>
+          <a:p>
+            <a:pPr defTabSz="914377"/>
+            <a:r>
+              <a:rPr lang="en-US" sz="1400" b="1" dirty="0" smtClean="0">
+                <a:solidFill>
+                  <a:srgbClr val="4B5357"/>
+                </a:solidFill>
+                <a:latin typeface="Source Sans Pro" charset="0"/>
+                <a:ea typeface="Source Sans Pro" charset="0"/>
+                <a:cs typeface="Source Sans Pro" charset="0"/>
+              </a:rPr>
+              <a:t>GitHub Repository</a:t>
+            </a:r>
+            <a:endParaRPr lang="en-US" sz="1400" b="1" dirty="0">
+              <a:solidFill>
+                <a:srgbClr val="4B5357"/>
+              </a:solidFill>
+              <a:latin typeface="Source Sans Pro" charset="0"/>
+              <a:ea typeface="Source Sans Pro" charset="0"/>
+              <a:cs typeface="Source Sans Pro" charset="0"/>
+            </a:endParaRPr>
+          </a:p>
+        </p:txBody>
+      </p:sp>
+      <p:sp>
+        <p:nvSpPr>
+          <p:cNvPr id="74" name="TextBox 73"/>
+          <p:cNvSpPr txBox="1"/>
+          <p:nvPr/>
+        </p:nvSpPr>
+        <p:spPr>
+          <a:xfrm>
+            <a:off x="1190957" y="3336741"/>
+            <a:ext cx="2652977" cy="246221"/>
+          </a:xfrm>
+          <a:prstGeom prst="rect">
+            <a:avLst/>
+          </a:prstGeom>
+          <a:noFill/>
+        </p:spPr>
+        <p:txBody>
+          <a:bodyPr wrap="square" rtlCol="0">
+            <a:spAutoFit/>
+          </a:bodyPr>
+          <a:lstStyle>
+            <a:defPPr>
+              <a:defRPr lang="en-US"/>
+            </a:defPPr>
+            <a:lvl1pPr marL="285750" indent="-285750">
+              <a:buFont typeface="Arial" panose="020B0604020202020204" pitchFamily="34" charset="0"/>
+              <a:buChar char="•"/>
+              <a:defRPr sz="1000">
+                <a:latin typeface="Source Sans Pro" charset="0"/>
+                <a:ea typeface="Source Sans Pro" charset="0"/>
+                <a:cs typeface="Source Sans Pro" charset="0"/>
+              </a:defRPr>
+            </a:lvl1pPr>
+          </a:lstStyle>
+          <a:p>
+            <a:pPr marL="285750" marR="0" lvl="0" indent="-285750" defTabSz="914377" eaLnBrk="1" fontAlgn="auto" latinLnBrk="0" hangingPunct="1">
+              <a:lnSpc>
+                <a:spcPct val="100000"/>
+              </a:lnSpc>
+              <a:spcBef>
+                <a:spcPts val="0"/>
+              </a:spcBef>
+              <a:spcAft>
+                <a:spcPts val="0"/>
+              </a:spcAft>
+              <a:buClrTx/>
+              <a:buSzTx/>
+              <a:buFont typeface="Arial" panose="020B0604020202020204" pitchFamily="34" charset="0"/>
+              <a:buChar char="•"/>
+              <a:tabLst/>
+              <a:defRPr/>
+            </a:pPr>
+            <a:endParaRPr kumimoji="0" lang="en-US" sz="1000" b="0" i="0" u="none" strike="noStrike" kern="0" cap="none" spc="0" normalizeH="0" baseline="0" noProof="0" dirty="0">
+              <a:ln>
+                <a:noFill/>
+              </a:ln>
+              <a:solidFill>
+                <a:srgbClr val="4B5357"/>
+              </a:solidFill>
+              <a:effectLst/>
+              <a:uLnTx/>
+              <a:uFillTx/>
+              <a:latin typeface="Source Sans Pro" charset="0"/>
+              <a:ea typeface="Source Sans Pro" charset="0"/>
+            </a:endParaRPr>
+          </a:p>
+        </p:txBody>
+      </p:sp>
+      <p:sp>
+        <p:nvSpPr>
+          <p:cNvPr id="75" name="Rounded Rectangle 74"/>
+          <p:cNvSpPr/>
+          <p:nvPr/>
+        </p:nvSpPr>
+        <p:spPr>
+          <a:xfrm>
+            <a:off x="1631503" y="2719268"/>
+            <a:ext cx="2332866" cy="1403752"/>
+          </a:xfrm>
+          <a:prstGeom prst="roundRect">
+            <a:avLst>
+              <a:gd name="adj" fmla="val 7458"/>
+            </a:avLst>
+          </a:prstGeom>
+          <a:solidFill>
+            <a:srgbClr val="FFFFFF">
+              <a:lumMod val="85000"/>
+            </a:srgbClr>
+          </a:solidFill>
+          <a:ln w="12700" cap="flat" cmpd="sng" algn="ctr">
+            <a:solidFill>
+              <a:srgbClr val="CBD3D7"/>
+            </a:solidFill>
+            <a:prstDash val="solid"/>
+          </a:ln>
+          <a:effectLst/>
+        </p:spPr>
+        <p:txBody>
+          <a:bodyPr rtlCol="0" anchor="ctr"/>
+          <a:lstStyle/>
+          <a:p>
+            <a:pPr marL="0" marR="0" lvl="0" indent="0" algn="ctr" defTabSz="914400" eaLnBrk="1" fontAlgn="auto" latinLnBrk="0" hangingPunct="1">
+              <a:lnSpc>
+                <a:spcPct val="100000"/>
+              </a:lnSpc>
+              <a:spcBef>
+                <a:spcPts val="0"/>
+              </a:spcBef>
+              <a:spcAft>
+                <a:spcPts val="0"/>
+              </a:spcAft>
+              <a:buClrTx/>
+              <a:buSzTx/>
+              <a:buFontTx/>
+              <a:buNone/>
+              <a:tabLst/>
+              <a:defRPr/>
+            </a:pPr>
+            <a:endParaRPr kumimoji="0" lang="en-US" sz="1800" b="0" i="0" u="none" strike="noStrike" kern="0" cap="none" spc="0" normalizeH="0" baseline="0" noProof="0" dirty="0" smtClean="0">
+              <a:ln>
+                <a:noFill/>
+              </a:ln>
+              <a:solidFill>
+                <a:srgbClr val="FFFFFF"/>
+              </a:solidFill>
+              <a:effectLst/>
+              <a:uLnTx/>
+              <a:uFillTx/>
+              <a:latin typeface="Calibri" panose="020F0502020204030204"/>
+              <a:ea typeface="+mn-ea"/>
+              <a:cs typeface="+mn-cs"/>
+            </a:endParaRPr>
+          </a:p>
+        </p:txBody>
+      </p:sp>
+      <p:sp>
+        <p:nvSpPr>
+          <p:cNvPr id="76" name="Rounded Rectangle 75"/>
+          <p:cNvSpPr/>
+          <p:nvPr/>
+        </p:nvSpPr>
+        <p:spPr>
+          <a:xfrm>
+            <a:off x="1631503" y="4290046"/>
+            <a:ext cx="2427981" cy="579114"/>
+          </a:xfrm>
+          <a:prstGeom prst="roundRect">
+            <a:avLst>
+              <a:gd name="adj" fmla="val 15733"/>
+            </a:avLst>
+          </a:prstGeom>
+          <a:solidFill>
+            <a:srgbClr val="FFFFFF">
+              <a:lumMod val="85000"/>
+            </a:srgbClr>
+          </a:solidFill>
+          <a:ln w="12700" cap="flat" cmpd="sng" algn="ctr">
+            <a:solidFill>
+              <a:srgbClr val="CBD3D7"/>
+            </a:solidFill>
+            <a:prstDash val="solid"/>
+          </a:ln>
+          <a:effectLst/>
+        </p:spPr>
+        <p:txBody>
+          <a:bodyPr rtlCol="0" anchor="ctr"/>
+          <a:lstStyle/>
+          <a:p>
+            <a:pPr marL="0" marR="0" lvl="0" indent="0" algn="ctr" defTabSz="914400" eaLnBrk="1" fontAlgn="auto" latinLnBrk="0" hangingPunct="1">
+              <a:lnSpc>
+                <a:spcPct val="100000"/>
+              </a:lnSpc>
+              <a:spcBef>
+                <a:spcPts val="0"/>
+              </a:spcBef>
+              <a:spcAft>
+                <a:spcPts val="0"/>
+              </a:spcAft>
+              <a:buClrTx/>
+              <a:buSzTx/>
+              <a:buFontTx/>
+              <a:buNone/>
+              <a:tabLst/>
+              <a:defRPr/>
+            </a:pPr>
+            <a:endParaRPr kumimoji="0" lang="en-US" sz="1800" b="0" i="0" u="none" strike="noStrike" kern="0" cap="none" spc="0" normalizeH="0" baseline="0" noProof="0" dirty="0" smtClean="0">
+              <a:ln>
+                <a:noFill/>
+              </a:ln>
+              <a:solidFill>
+                <a:srgbClr val="FFFFFF"/>
+              </a:solidFill>
+              <a:effectLst/>
+              <a:uLnTx/>
+              <a:uFillTx/>
+              <a:latin typeface="Calibri" panose="020F0502020204030204"/>
+              <a:ea typeface="+mn-ea"/>
+              <a:cs typeface="+mn-cs"/>
+            </a:endParaRPr>
+          </a:p>
+        </p:txBody>
+      </p:sp>
+      <p:pic>
+        <p:nvPicPr>
+          <p:cNvPr id="77" name="Picture 76">
+            <a:extLst>
+              <a:ext uri="{FF2B5EF4-FFF2-40B4-BE49-F238E27FC236}">
+                <a16:creationId xmlns="" xmlns:a16="http://schemas.microsoft.com/office/drawing/2014/main" id="{72176D6D-182A-4BB5-8EA3-0ACC3EEFD101}"/>
+              </a:ext>
+            </a:extLst>
+          </p:cNvPr>
+          <p:cNvPicPr>
+            <a:picLocks noChangeAspect="1"/>
+          </p:cNvPicPr>
+          <p:nvPr/>
+        </p:nvPicPr>
+        <p:blipFill>
+          <a:blip r:embed="rId3" cstate="print">
+            <a:extLst>
+              <a:ext uri="{28A0092B-C50C-407E-A947-70E740481C1C}">
+                <a14:useLocalDpi xmlns:a14="http://schemas.microsoft.com/office/drawing/2010/main" val="0"/>
+              </a:ext>
+            </a:extLst>
+          </a:blip>
+          <a:stretch>
+            <a:fillRect/>
+          </a:stretch>
+        </p:blipFill>
+        <p:spPr>
+          <a:xfrm>
+            <a:off x="1870331" y="3394355"/>
+            <a:ext cx="973103" cy="322677"/>
+          </a:xfrm>
+          <a:prstGeom prst="rect">
+            <a:avLst/>
+          </a:prstGeom>
+        </p:spPr>
+      </p:pic>
+      <p:sp>
+        <p:nvSpPr>
+          <p:cNvPr id="78" name="TextBox 77"/>
+          <p:cNvSpPr txBox="1"/>
+          <p:nvPr/>
+        </p:nvSpPr>
+        <p:spPr>
+          <a:xfrm>
+            <a:off x="1381140" y="4425714"/>
+            <a:ext cx="2250756" cy="307777"/>
+          </a:xfrm>
+          <a:prstGeom prst="rect">
+            <a:avLst/>
+          </a:prstGeom>
+          <a:noFill/>
+        </p:spPr>
+        <p:txBody>
+          <a:bodyPr wrap="square" rtlCol="0">
+            <a:spAutoFit/>
+          </a:bodyPr>
+          <a:lstStyle/>
+          <a:p>
+            <a:pPr algn="ctr" defTabSz="914377"/>
+            <a:r>
+              <a:rPr lang="en-US" sz="1400" b="1" dirty="0" smtClean="0">
+                <a:solidFill>
+                  <a:srgbClr val="4B5357"/>
+                </a:solidFill>
+                <a:latin typeface="Source Sans Pro" charset="0"/>
+                <a:ea typeface="Source Sans Pro" charset="0"/>
+                <a:cs typeface="Source Sans Pro" charset="0"/>
+              </a:rPr>
+              <a:t>Module Manager</a:t>
+            </a:r>
+            <a:endParaRPr lang="en-US" sz="1400" b="1" dirty="0">
+              <a:solidFill>
+                <a:srgbClr val="4B5357"/>
+              </a:solidFill>
+              <a:latin typeface="Source Sans Pro" charset="0"/>
+              <a:ea typeface="Source Sans Pro" charset="0"/>
+              <a:cs typeface="Source Sans Pro" charset="0"/>
+            </a:endParaRPr>
+          </a:p>
+        </p:txBody>
+      </p:sp>
+      <p:pic>
+        <p:nvPicPr>
+          <p:cNvPr id="79" name="Picture 78">
+            <a:extLst>
+              <a:ext uri="{FF2B5EF4-FFF2-40B4-BE49-F238E27FC236}">
+                <a16:creationId xmlns:a16="http://schemas.microsoft.com/office/drawing/2014/main" xmlns="" id="{6E47523C-39E3-414E-8E44-2AF044AA7D00}"/>
+              </a:ext>
+            </a:extLst>
+          </p:cNvPr>
+          <p:cNvPicPr>
+            <a:picLocks noChangeAspect="1"/>
+          </p:cNvPicPr>
+          <p:nvPr/>
+        </p:nvPicPr>
+        <p:blipFill>
+          <a:blip r:embed="rId4" cstate="print">
+            <a:extLst>
+              <a:ext uri="{28A0092B-C50C-407E-A947-70E740481C1C}">
+                <a14:useLocalDpi xmlns:a14="http://schemas.microsoft.com/office/drawing/2010/main" val="0"/>
+              </a:ext>
+            </a:extLst>
+          </a:blip>
+          <a:stretch>
+            <a:fillRect/>
+          </a:stretch>
+        </p:blipFill>
+        <p:spPr>
+          <a:xfrm>
+            <a:off x="5151274" y="3217828"/>
+            <a:ext cx="455462" cy="459117"/>
           </a:xfrm>
           <a:prstGeom prst="rect">
             <a:avLst/>
@@ -3479,10 +4175,91 @@
       </p:pic>
       <p:pic>
         <p:nvPicPr>
-          <p:cNvPr id="7" name="Picture 6">
-            <a:extLst>
-              <a:ext uri="{FF2B5EF4-FFF2-40B4-BE49-F238E27FC236}">
-                <a16:creationId xmlns:a16="http://schemas.microsoft.com/office/drawing/2014/main" id="{579DE3DA-C1FA-49CF-890F-DF5AEF9DE1DD}"/>
+          <p:cNvPr id="80" name="Picture 79">
+            <a:extLst>
+              <a:ext uri="{FF2B5EF4-FFF2-40B4-BE49-F238E27FC236}">
+                <a16:creationId xmlns:a16="http://schemas.microsoft.com/office/drawing/2014/main" xmlns="" id="{B9BC1CCF-31EE-4DC1-ABBF-BD10F1CF41F4}"/>
+              </a:ext>
+            </a:extLst>
+          </p:cNvPr>
+          <p:cNvPicPr>
+            <a:picLocks noChangeAspect="1"/>
+          </p:cNvPicPr>
+          <p:nvPr/>
+        </p:nvPicPr>
+        <p:blipFill>
+          <a:blip r:embed="rId5" cstate="print">
+            <a:extLst>
+              <a:ext uri="{28A0092B-C50C-407E-A947-70E740481C1C}">
+                <a14:useLocalDpi xmlns:a14="http://schemas.microsoft.com/office/drawing/2010/main" val="0"/>
+              </a:ext>
+            </a:extLst>
+          </a:blip>
+          <a:stretch>
+            <a:fillRect/>
+          </a:stretch>
+        </p:blipFill>
+        <p:spPr>
+          <a:xfrm>
+            <a:off x="3376850" y="1268759"/>
+            <a:ext cx="1242798" cy="1242794"/>
+          </a:xfrm>
+          <a:prstGeom prst="rect">
+            <a:avLst/>
+          </a:prstGeom>
+        </p:spPr>
+      </p:pic>
+      <p:sp>
+        <p:nvSpPr>
+          <p:cNvPr id="81" name="TextBox 80"/>
+          <p:cNvSpPr txBox="1"/>
+          <p:nvPr/>
+        </p:nvSpPr>
+        <p:spPr>
+          <a:xfrm>
+            <a:off x="1347486" y="2778778"/>
+            <a:ext cx="2250756" cy="307777"/>
+          </a:xfrm>
+          <a:prstGeom prst="rect">
+            <a:avLst/>
+          </a:prstGeom>
+          <a:noFill/>
+        </p:spPr>
+        <p:txBody>
+          <a:bodyPr wrap="square" rtlCol="0">
+            <a:spAutoFit/>
+          </a:bodyPr>
+          <a:lstStyle/>
+          <a:p>
+            <a:pPr algn="ctr" defTabSz="914377"/>
+            <a:r>
+              <a:rPr lang="en-US" sz="1400" b="1" dirty="0" smtClean="0">
+                <a:solidFill>
+                  <a:srgbClr val="4B5357"/>
+                </a:solidFill>
+                <a:latin typeface="Source Sans Pro" charset="0"/>
+                <a:ea typeface="Source Sans Pro" charset="0"/>
+                <a:cs typeface="Source Sans Pro" charset="0"/>
+              </a:rPr>
+              <a:t>SDK (Desktop)</a:t>
+            </a:r>
+            <a:endParaRPr lang="en-US" sz="1400" b="1" dirty="0">
+              <a:solidFill>
+                <a:srgbClr val="4B5357"/>
+              </a:solidFill>
+              <a:latin typeface="Source Sans Pro" charset="0"/>
+              <a:ea typeface="Source Sans Pro" charset="0"/>
+              <a:cs typeface="Source Sans Pro" charset="0"/>
+            </a:endParaRPr>
+          </a:p>
+        </p:txBody>
+      </p:sp>
+      <p:pic>
+        <p:nvPicPr>
+          <p:cNvPr id="82" name="Picture 81">
+            <a:extLst>
+              <a:ext uri="{FF2B5EF4-FFF2-40B4-BE49-F238E27FC236}">
+                <a16:creationId xmlns:a16="http://schemas.microsoft.com/office/drawing/2014/main" xmlns="" id="{579DE3DA-C1FA-49CF-890F-DF5AEF9DE1DD}"/>
               </a:ext>
             </a:extLst>
           </p:cNvPr>
@@ -3492,7 +4269,7 @@
           <p:nvPr/>
         </p:nvPicPr>
         <p:blipFill rotWithShape="1">
-          <a:blip r:embed="rId3" cstate="print">
+          <a:blip r:embed="rId6" cstate="print">
             <a:extLst>
               <a:ext uri="{28A0092B-C50C-407E-A947-70E740481C1C}">
                 <a14:useLocalDpi xmlns:a14="http://schemas.microsoft.com/office/drawing/2010/main" val="0"/>
@@ -3504,8 +4281,8 @@
         </p:blipFill>
         <p:spPr>
           <a:xfrm>
-            <a:off x="2235376" y="1504478"/>
-            <a:ext cx="1382674" cy="1835923"/>
+            <a:off x="3019840" y="2840679"/>
+            <a:ext cx="851029" cy="1130001"/>
           </a:xfrm>
           <a:prstGeom prst="rect">
             <a:avLst/>
@@ -3514,20 +4291,14 @@
       </p:pic>
       <p:pic>
         <p:nvPicPr>
-          <p:cNvPr id="8" name="Picture 7">
-            <a:extLst>
-              <a:ext uri="{FF2B5EF4-FFF2-40B4-BE49-F238E27FC236}">
-                <a16:creationId xmlns:a16="http://schemas.microsoft.com/office/drawing/2014/main" id="{7293D91B-1E16-4730-B30E-222FDE2DA922}"/>
-              </a:ext>
-            </a:extLst>
-          </p:cNvPr>
+          <p:cNvPr id="83" name="Picture 82"/>
           <p:cNvPicPr>
             <a:picLocks noChangeAspect="1"/>
           </p:cNvPicPr>
           <p:nvPr/>
         </p:nvPicPr>
         <p:blipFill>
-          <a:blip r:embed="rId4">
+          <a:blip r:embed="rId7" cstate="print">
             <a:extLst>
               <a:ext uri="{28A0092B-C50C-407E-A947-70E740481C1C}">
                 <a14:useLocalDpi xmlns:a14="http://schemas.microsoft.com/office/drawing/2010/main" val="0"/>
@@ -3539,9 +4310,9 @@
           </a:stretch>
         </p:blipFill>
         <p:spPr>
-          <a:xfrm rot="14400000">
-            <a:off x="2619841" y="1962892"/>
-            <a:ext cx="992686" cy="541014"/>
+          <a:xfrm>
+            <a:off x="8777601" y="1557258"/>
+            <a:ext cx="457283" cy="457283"/>
           </a:xfrm>
           <a:prstGeom prst="rect">
             <a:avLst/>
@@ -3550,20 +4321,14 @@
       </p:pic>
       <p:pic>
         <p:nvPicPr>
-          <p:cNvPr id="10" name="Picture 9">
-            <a:extLst>
-              <a:ext uri="{FF2B5EF4-FFF2-40B4-BE49-F238E27FC236}">
-                <a16:creationId xmlns:a16="http://schemas.microsoft.com/office/drawing/2014/main" id="{72176D6D-182A-4BB5-8EA3-0ACC3EEFD101}"/>
-              </a:ext>
-            </a:extLst>
-          </p:cNvPr>
+          <p:cNvPr id="84" name="Picture 83"/>
           <p:cNvPicPr>
             <a:picLocks noChangeAspect="1"/>
           </p:cNvPicPr>
           <p:nvPr/>
         </p:nvPicPr>
         <p:blipFill>
-          <a:blip r:embed="rId5">
+          <a:blip r:embed="rId7" cstate="print">
             <a:extLst>
               <a:ext uri="{28A0092B-C50C-407E-A947-70E740481C1C}">
                 <a14:useLocalDpi xmlns:a14="http://schemas.microsoft.com/office/drawing/2010/main" val="0"/>
@@ -3576,8 +4341,8 @@
         </p:blipFill>
         <p:spPr>
           <a:xfrm>
-            <a:off x="2528771" y="4493112"/>
-            <a:ext cx="795884" cy="263912"/>
+            <a:off x="8740209" y="2877818"/>
+            <a:ext cx="457283" cy="457283"/>
           </a:xfrm>
           <a:prstGeom prst="rect">
             <a:avLst/>
@@ -3586,20 +4351,14 @@
       </p:pic>
       <p:pic>
         <p:nvPicPr>
-          <p:cNvPr id="5" name="Picture 4">
-            <a:extLst>
-              <a:ext uri="{FF2B5EF4-FFF2-40B4-BE49-F238E27FC236}">
-                <a16:creationId xmlns:a16="http://schemas.microsoft.com/office/drawing/2014/main" id="{B9BC1CCF-31EE-4DC1-ABBF-BD10F1CF41F4}"/>
-              </a:ext>
-            </a:extLst>
-          </p:cNvPr>
+          <p:cNvPr id="85" name="Picture 84"/>
           <p:cNvPicPr>
             <a:picLocks noChangeAspect="1"/>
           </p:cNvPicPr>
           <p:nvPr/>
         </p:nvPicPr>
         <p:blipFill>
-          <a:blip r:embed="rId6" cstate="print">
+          <a:blip r:embed="rId8" cstate="print">
             <a:extLst>
               <a:ext uri="{28A0092B-C50C-407E-A947-70E740481C1C}">
                 <a14:useLocalDpi xmlns:a14="http://schemas.microsoft.com/office/drawing/2010/main" val="0"/>
@@ -3612,556 +4371,8 @@
         </p:blipFill>
         <p:spPr>
           <a:xfrm>
-            <a:off x="0" y="143332"/>
-            <a:ext cx="1242798" cy="1242794"/>
-          </a:xfrm>
-          <a:prstGeom prst="rect">
-            <a:avLst/>
-          </a:prstGeom>
-        </p:spPr>
-      </p:pic>
-      <p:sp>
-        <p:nvSpPr>
-          <p:cNvPr id="9" name="Rounded Rectangle 60">
-            <a:extLst>
-              <a:ext uri="{FF2B5EF4-FFF2-40B4-BE49-F238E27FC236}">
-                <a16:creationId xmlns:a16="http://schemas.microsoft.com/office/drawing/2014/main" id="{9D98ABA5-044C-47F8-87D4-73CC3305FC69}"/>
-              </a:ext>
-            </a:extLst>
-          </p:cNvPr>
-          <p:cNvSpPr/>
-          <p:nvPr/>
-        </p:nvSpPr>
-        <p:spPr>
-          <a:xfrm>
-            <a:off x="3021297" y="3429602"/>
-            <a:ext cx="1436254" cy="414625"/>
-          </a:xfrm>
-          <a:prstGeom prst="roundRect">
-            <a:avLst>
-              <a:gd name="adj" fmla="val 15733"/>
-            </a:avLst>
-          </a:prstGeom>
-          <a:solidFill>
-            <a:schemeClr val="bg1">
-              <a:lumMod val="95000"/>
-            </a:schemeClr>
-          </a:solidFill>
-          <a:ln w="12700">
-            <a:solidFill>
-              <a:schemeClr val="bg2"/>
-            </a:solidFill>
-          </a:ln>
-        </p:spPr>
-        <p:style>
-          <a:lnRef idx="2">
-            <a:schemeClr val="accent1">
-              <a:shade val="50000"/>
-            </a:schemeClr>
-          </a:lnRef>
-          <a:fillRef idx="1">
-            <a:schemeClr val="accent1"/>
-          </a:fillRef>
-          <a:effectRef idx="0">
-            <a:schemeClr val="accent1"/>
-          </a:effectRef>
-          <a:fontRef idx="minor">
-            <a:schemeClr val="lt1"/>
-          </a:fontRef>
-        </p:style>
-        <p:txBody>
-          <a:bodyPr rtlCol="0" anchor="ctr"/>
-          <a:lstStyle/>
-          <a:p>
-            <a:pPr algn="ctr"/>
-            <a:r>
-              <a:rPr lang="en-US" sz="1100">
-                <a:solidFill>
-                  <a:schemeClr val="tx1"/>
-                </a:solidFill>
-              </a:rPr>
-              <a:t>Heap Analyzer</a:t>
-            </a:r>
-            <a:endParaRPr lang="en-US" sz="1100" dirty="0">
-              <a:solidFill>
-                <a:schemeClr val="tx1"/>
-              </a:solidFill>
-            </a:endParaRPr>
-          </a:p>
-        </p:txBody>
-      </p:sp>
-      <p:sp>
-        <p:nvSpPr>
-          <p:cNvPr id="12" name="Rounded Rectangle 60">
-            <a:extLst>
-              <a:ext uri="{FF2B5EF4-FFF2-40B4-BE49-F238E27FC236}">
-                <a16:creationId xmlns:a16="http://schemas.microsoft.com/office/drawing/2014/main" id="{7F4C303A-9818-44D2-806E-A66001E713EA}"/>
-              </a:ext>
-            </a:extLst>
-          </p:cNvPr>
-          <p:cNvSpPr/>
-          <p:nvPr/>
-        </p:nvSpPr>
-        <p:spPr>
-          <a:xfrm>
-            <a:off x="1405943" y="3429602"/>
-            <a:ext cx="1436254" cy="414625"/>
-          </a:xfrm>
-          <a:prstGeom prst="roundRect">
-            <a:avLst>
-              <a:gd name="adj" fmla="val 15733"/>
-            </a:avLst>
-          </a:prstGeom>
-          <a:solidFill>
-            <a:schemeClr val="bg1">
-              <a:lumMod val="95000"/>
-            </a:schemeClr>
-          </a:solidFill>
-          <a:ln w="12700">
-            <a:solidFill>
-              <a:schemeClr val="bg2"/>
-            </a:solidFill>
-          </a:ln>
-        </p:spPr>
-        <p:style>
-          <a:lnRef idx="2">
-            <a:schemeClr val="accent1">
-              <a:shade val="50000"/>
-            </a:schemeClr>
-          </a:lnRef>
-          <a:fillRef idx="1">
-            <a:schemeClr val="accent1"/>
-          </a:fillRef>
-          <a:effectRef idx="0">
-            <a:schemeClr val="accent1"/>
-          </a:effectRef>
-          <a:fontRef idx="minor">
-            <a:schemeClr val="lt1"/>
-          </a:fontRef>
-        </p:style>
-        <p:txBody>
-          <a:bodyPr rtlCol="0" anchor="ctr"/>
-          <a:lstStyle/>
-          <a:p>
-            <a:pPr algn="ctr"/>
-            <a:r>
-              <a:rPr lang="en-US" sz="1100">
-                <a:solidFill>
-                  <a:schemeClr val="tx1"/>
-                </a:solidFill>
-              </a:rPr>
-              <a:t>Memory Map Analyzer</a:t>
-            </a:r>
-            <a:endParaRPr lang="en-US" sz="1100" dirty="0">
-              <a:solidFill>
-                <a:schemeClr val="tx1"/>
-              </a:solidFill>
-            </a:endParaRPr>
-          </a:p>
-        </p:txBody>
-      </p:sp>
-      <p:sp>
-        <p:nvSpPr>
-          <p:cNvPr id="13" name="Rounded Rectangle 60">
-            <a:extLst>
-              <a:ext uri="{FF2B5EF4-FFF2-40B4-BE49-F238E27FC236}">
-                <a16:creationId xmlns:a16="http://schemas.microsoft.com/office/drawing/2014/main" id="{5EEF5D96-1BA5-48F5-838A-C5673F7E5BAD}"/>
-              </a:ext>
-            </a:extLst>
-          </p:cNvPr>
-          <p:cNvSpPr/>
-          <p:nvPr/>
-        </p:nvSpPr>
-        <p:spPr>
-          <a:xfrm>
-            <a:off x="1405943" y="3961357"/>
-            <a:ext cx="1436254" cy="414625"/>
-          </a:xfrm>
-          <a:prstGeom prst="roundRect">
-            <a:avLst>
-              <a:gd name="adj" fmla="val 15733"/>
-            </a:avLst>
-          </a:prstGeom>
-          <a:solidFill>
-            <a:schemeClr val="bg1">
-              <a:lumMod val="95000"/>
-            </a:schemeClr>
-          </a:solidFill>
-          <a:ln w="12700">
-            <a:solidFill>
-              <a:schemeClr val="bg2"/>
-            </a:solidFill>
-          </a:ln>
-        </p:spPr>
-        <p:style>
-          <a:lnRef idx="2">
-            <a:schemeClr val="accent1">
-              <a:shade val="50000"/>
-            </a:schemeClr>
-          </a:lnRef>
-          <a:fillRef idx="1">
-            <a:schemeClr val="accent1"/>
-          </a:fillRef>
-          <a:effectRef idx="0">
-            <a:schemeClr val="accent1"/>
-          </a:effectRef>
-          <a:fontRef idx="minor">
-            <a:schemeClr val="lt1"/>
-          </a:fontRef>
-        </p:style>
-        <p:txBody>
-          <a:bodyPr rtlCol="0" anchor="ctr"/>
-          <a:lstStyle/>
-          <a:p>
-            <a:pPr algn="ctr"/>
-            <a:r>
-              <a:rPr lang="en-US" sz="1100">
-                <a:solidFill>
-                  <a:schemeClr val="tx1"/>
-                </a:solidFill>
-              </a:rPr>
-              <a:t>Font Designer</a:t>
-            </a:r>
-            <a:endParaRPr lang="en-US" sz="1100" dirty="0">
-              <a:solidFill>
-                <a:schemeClr val="tx1"/>
-              </a:solidFill>
-            </a:endParaRPr>
-          </a:p>
-        </p:txBody>
-      </p:sp>
-      <p:sp>
-        <p:nvSpPr>
-          <p:cNvPr id="14" name="Rounded Rectangle 60">
-            <a:extLst>
-              <a:ext uri="{FF2B5EF4-FFF2-40B4-BE49-F238E27FC236}">
-                <a16:creationId xmlns:a16="http://schemas.microsoft.com/office/drawing/2014/main" id="{78227817-7E07-406E-80F6-E9F15C4D68A6}"/>
-              </a:ext>
-            </a:extLst>
-          </p:cNvPr>
-          <p:cNvSpPr/>
-          <p:nvPr/>
-        </p:nvSpPr>
-        <p:spPr>
-          <a:xfrm>
-            <a:off x="3021297" y="3956706"/>
-            <a:ext cx="1436254" cy="414625"/>
-          </a:xfrm>
-          <a:prstGeom prst="roundRect">
-            <a:avLst>
-              <a:gd name="adj" fmla="val 15733"/>
-            </a:avLst>
-          </a:prstGeom>
-          <a:solidFill>
-            <a:schemeClr val="bg1">
-              <a:lumMod val="95000"/>
-            </a:schemeClr>
-          </a:solidFill>
-          <a:ln w="12700">
-            <a:solidFill>
-              <a:schemeClr val="bg2"/>
-            </a:solidFill>
-          </a:ln>
-        </p:spPr>
-        <p:style>
-          <a:lnRef idx="2">
-            <a:schemeClr val="accent1">
-              <a:shade val="50000"/>
-            </a:schemeClr>
-          </a:lnRef>
-          <a:fillRef idx="1">
-            <a:schemeClr val="accent1"/>
-          </a:fillRef>
-          <a:effectRef idx="0">
-            <a:schemeClr val="accent1"/>
-          </a:effectRef>
-          <a:fontRef idx="minor">
-            <a:schemeClr val="lt1"/>
-          </a:fontRef>
-        </p:style>
-        <p:txBody>
-          <a:bodyPr rtlCol="0" anchor="ctr"/>
-          <a:lstStyle/>
-          <a:p>
-            <a:pPr algn="ctr"/>
-            <a:r>
-              <a:rPr lang="en-US" sz="1100">
-                <a:solidFill>
-                  <a:schemeClr val="tx1"/>
-                </a:solidFill>
-              </a:rPr>
-              <a:t>MMM Integration</a:t>
-            </a:r>
-            <a:endParaRPr lang="en-US" sz="1100" dirty="0">
-              <a:solidFill>
-                <a:schemeClr val="tx1"/>
-              </a:solidFill>
-            </a:endParaRPr>
-          </a:p>
-        </p:txBody>
-      </p:sp>
-      <p:sp>
-        <p:nvSpPr>
-          <p:cNvPr id="15" name="Rounded Rectangle 60">
-            <a:extLst>
-              <a:ext uri="{FF2B5EF4-FFF2-40B4-BE49-F238E27FC236}">
-                <a16:creationId xmlns:a16="http://schemas.microsoft.com/office/drawing/2014/main" id="{94706539-CC65-4B90-8A3A-062DFD4CD88A}"/>
-              </a:ext>
-            </a:extLst>
-          </p:cNvPr>
-          <p:cNvSpPr/>
-          <p:nvPr/>
-        </p:nvSpPr>
-        <p:spPr>
-          <a:xfrm>
-            <a:off x="4811662" y="900615"/>
-            <a:ext cx="3343564" cy="1149857"/>
-          </a:xfrm>
-          <a:prstGeom prst="roundRect">
-            <a:avLst>
-              <a:gd name="adj" fmla="val 15733"/>
-            </a:avLst>
-          </a:prstGeom>
-          <a:solidFill>
-            <a:schemeClr val="bg1">
-              <a:lumMod val="85000"/>
-            </a:schemeClr>
-          </a:solidFill>
-          <a:ln w="12700">
-            <a:solidFill>
-              <a:schemeClr val="bg2"/>
-            </a:solidFill>
-          </a:ln>
-        </p:spPr>
-        <p:style>
-          <a:lnRef idx="2">
-            <a:schemeClr val="accent1">
-              <a:shade val="50000"/>
-            </a:schemeClr>
-          </a:lnRef>
-          <a:fillRef idx="1">
-            <a:schemeClr val="accent1"/>
-          </a:fillRef>
-          <a:effectRef idx="0">
-            <a:schemeClr val="accent1"/>
-          </a:effectRef>
-          <a:fontRef idx="minor">
-            <a:schemeClr val="lt1"/>
-          </a:fontRef>
-        </p:style>
-        <p:txBody>
-          <a:bodyPr rtlCol="0" anchor="ctr"/>
-          <a:lstStyle/>
-          <a:p>
-            <a:pPr algn="ctr"/>
-            <a:r>
-              <a:rPr lang="en-US">
-                <a:solidFill>
-                  <a:schemeClr val="tx1"/>
-                </a:solidFill>
-              </a:rPr>
-              <a:t>MicroEJ Module Manager</a:t>
-            </a:r>
-            <a:endParaRPr lang="en-US" dirty="0">
-              <a:solidFill>
-                <a:schemeClr val="tx1"/>
-              </a:solidFill>
-            </a:endParaRPr>
-          </a:p>
-        </p:txBody>
-      </p:sp>
-      <p:sp>
-        <p:nvSpPr>
-          <p:cNvPr id="16" name="Rounded Rectangle 60">
-            <a:extLst>
-              <a:ext uri="{FF2B5EF4-FFF2-40B4-BE49-F238E27FC236}">
-                <a16:creationId xmlns:a16="http://schemas.microsoft.com/office/drawing/2014/main" id="{FA385B64-515F-42AB-B2F3-FED41DF6DD3B}"/>
-              </a:ext>
-            </a:extLst>
-          </p:cNvPr>
-          <p:cNvSpPr/>
-          <p:nvPr/>
-        </p:nvSpPr>
-        <p:spPr>
-          <a:xfrm>
-            <a:off x="4811662" y="2242711"/>
-            <a:ext cx="3343564" cy="1156269"/>
-          </a:xfrm>
-          <a:prstGeom prst="roundRect">
-            <a:avLst>
-              <a:gd name="adj" fmla="val 15733"/>
-            </a:avLst>
-          </a:prstGeom>
-          <a:solidFill>
-            <a:schemeClr val="bg1">
-              <a:lumMod val="85000"/>
-            </a:schemeClr>
-          </a:solidFill>
-          <a:ln w="12700">
-            <a:solidFill>
-              <a:schemeClr val="bg2"/>
-            </a:solidFill>
-          </a:ln>
-        </p:spPr>
-        <p:style>
-          <a:lnRef idx="2">
-            <a:schemeClr val="accent1">
-              <a:shade val="50000"/>
-            </a:schemeClr>
-          </a:lnRef>
-          <a:fillRef idx="1">
-            <a:schemeClr val="accent1"/>
-          </a:fillRef>
-          <a:effectRef idx="0">
-            <a:schemeClr val="accent1"/>
-          </a:effectRef>
-          <a:fontRef idx="minor">
-            <a:schemeClr val="lt1"/>
-          </a:fontRef>
-        </p:style>
-        <p:txBody>
-          <a:bodyPr rtlCol="0" anchor="ctr"/>
-          <a:lstStyle/>
-          <a:p>
-            <a:pPr algn="ctr"/>
-            <a:r>
-              <a:rPr lang="en-US">
-                <a:solidFill>
-                  <a:schemeClr val="tx1"/>
-                </a:solidFill>
-              </a:rPr>
-              <a:t>           MMM CLI</a:t>
-            </a:r>
-            <a:endParaRPr lang="en-US" dirty="0">
-              <a:solidFill>
-                <a:schemeClr val="tx1"/>
-              </a:solidFill>
-            </a:endParaRPr>
-          </a:p>
-        </p:txBody>
-      </p:sp>
-      <p:sp>
-        <p:nvSpPr>
-          <p:cNvPr id="17" name="Rounded Rectangle 60">
-            <a:extLst>
-              <a:ext uri="{FF2B5EF4-FFF2-40B4-BE49-F238E27FC236}">
-                <a16:creationId xmlns:a16="http://schemas.microsoft.com/office/drawing/2014/main" id="{E1DAF35C-DC3E-415D-8C62-FCB417783867}"/>
-              </a:ext>
-            </a:extLst>
-          </p:cNvPr>
-          <p:cNvSpPr/>
-          <p:nvPr/>
-        </p:nvSpPr>
-        <p:spPr>
-          <a:xfrm>
-            <a:off x="4811662" y="3609122"/>
-            <a:ext cx="3343564" cy="1234002"/>
-          </a:xfrm>
-          <a:prstGeom prst="roundRect">
-            <a:avLst>
-              <a:gd name="adj" fmla="val 15733"/>
-            </a:avLst>
-          </a:prstGeom>
-          <a:solidFill>
-            <a:schemeClr val="bg1">
-              <a:lumMod val="85000"/>
-            </a:schemeClr>
-          </a:solidFill>
-          <a:ln w="12700">
-            <a:solidFill>
-              <a:schemeClr val="bg2"/>
-            </a:solidFill>
-          </a:ln>
-        </p:spPr>
-        <p:style>
-          <a:lnRef idx="2">
-            <a:schemeClr val="accent1">
-              <a:shade val="50000"/>
-            </a:schemeClr>
-          </a:lnRef>
-          <a:fillRef idx="1">
-            <a:schemeClr val="accent1"/>
-          </a:fillRef>
-          <a:effectRef idx="0">
-            <a:schemeClr val="accent1"/>
-          </a:effectRef>
-          <a:fontRef idx="minor">
-            <a:schemeClr val="lt1"/>
-          </a:fontRef>
-        </p:style>
-        <p:txBody>
-          <a:bodyPr rtlCol="0" anchor="ctr"/>
-          <a:lstStyle/>
-          <a:p>
-            <a:pPr algn="ctr"/>
-            <a:r>
-              <a:rPr lang="en-US">
-                <a:solidFill>
-                  <a:schemeClr val="tx1"/>
-                </a:solidFill>
-              </a:rPr>
-              <a:t>            Central Repository</a:t>
-            </a:r>
-          </a:p>
-          <a:p>
-            <a:pPr algn="ctr"/>
-            <a:r>
-              <a:rPr lang="en-US">
-                <a:solidFill>
-                  <a:schemeClr val="tx1"/>
-                </a:solidFill>
-              </a:rPr>
-              <a:t>        &amp;</a:t>
-            </a:r>
-          </a:p>
-          <a:p>
-            <a:pPr algn="ctr"/>
-            <a:r>
-              <a:rPr lang="en-US">
-                <a:solidFill>
-                  <a:schemeClr val="tx1"/>
-                </a:solidFill>
-              </a:rPr>
-              <a:t>           Forge Repository</a:t>
-            </a:r>
-            <a:endParaRPr lang="en-US" dirty="0">
-              <a:solidFill>
-                <a:schemeClr val="tx1"/>
-              </a:solidFill>
-            </a:endParaRPr>
-          </a:p>
-        </p:txBody>
-      </p:sp>
-      <p:pic>
-        <p:nvPicPr>
-          <p:cNvPr id="3" name="Picture 2">
-            <a:extLst>
-              <a:ext uri="{FF2B5EF4-FFF2-40B4-BE49-F238E27FC236}">
-                <a16:creationId xmlns:a16="http://schemas.microsoft.com/office/drawing/2014/main" id="{FB433D71-BC67-4FEE-8152-65C0301D29BE}"/>
-              </a:ext>
-            </a:extLst>
-          </p:cNvPr>
-          <p:cNvPicPr>
-            <a:picLocks noChangeAspect="1"/>
-          </p:cNvPicPr>
-          <p:nvPr/>
-        </p:nvPicPr>
-        <p:blipFill>
-          <a:blip r:embed="rId7">
-            <a:extLst>
-              <a:ext uri="{28A0092B-C50C-407E-A947-70E740481C1C}">
-                <a14:useLocalDpi xmlns:a14="http://schemas.microsoft.com/office/drawing/2010/main" val="0"/>
-              </a:ext>
-            </a:extLst>
-          </a:blip>
-          <a:stretch>
-            <a:fillRect/>
-          </a:stretch>
-        </p:blipFill>
-        <p:spPr>
-          <a:xfrm>
-            <a:off x="4663939" y="2425059"/>
-            <a:ext cx="1472272" cy="883363"/>
+            <a:off x="4778270" y="3944278"/>
+            <a:ext cx="1206683" cy="657548"/>
           </a:xfrm>
           <a:prstGeom prst="rect">
             <a:avLst/>
@@ -4170,40 +4381,73 @@
       </p:pic>
       <p:pic>
         <p:nvPicPr>
-          <p:cNvPr id="19" name="Picture 18">
-            <a:extLst>
-              <a:ext uri="{FF2B5EF4-FFF2-40B4-BE49-F238E27FC236}">
-                <a16:creationId xmlns:a16="http://schemas.microsoft.com/office/drawing/2014/main" id="{FD2C7B29-8676-4741-9A26-F7AC63E40248}"/>
-              </a:ext>
-            </a:extLst>
-          </p:cNvPr>
+          <p:cNvPr id="86" name="Picture 85"/>
           <p:cNvPicPr>
             <a:picLocks noChangeAspect="1"/>
           </p:cNvPicPr>
           <p:nvPr/>
         </p:nvPicPr>
         <p:blipFill>
-          <a:blip r:embed="rId8">
-            <a:extLst>
-              <a:ext uri="{28A0092B-C50C-407E-A947-70E740481C1C}">
-                <a14:useLocalDpi xmlns:a14="http://schemas.microsoft.com/office/drawing/2010/main" val="0"/>
-              </a:ext>
-            </a:extLst>
-          </a:blip>
+          <a:blip r:embed="rId9"/>
           <a:stretch>
             <a:fillRect/>
           </a:stretch>
         </p:blipFill>
         <p:spPr>
           <a:xfrm>
-            <a:off x="4890964" y="3827069"/>
-            <a:ext cx="915430" cy="915430"/>
+            <a:off x="3551883" y="4371806"/>
+            <a:ext cx="328204" cy="328204"/>
           </a:xfrm>
           <a:prstGeom prst="rect">
             <a:avLst/>
           </a:prstGeom>
         </p:spPr>
       </p:pic>
+      <p:sp>
+        <p:nvSpPr>
+          <p:cNvPr id="87" name="TextBox 86"/>
+          <p:cNvSpPr txBox="1"/>
+          <p:nvPr/>
+        </p:nvSpPr>
+        <p:spPr>
+          <a:xfrm>
+            <a:off x="4282726" y="2778778"/>
+            <a:ext cx="2250756" cy="307777"/>
+          </a:xfrm>
+          <a:prstGeom prst="rect">
+            <a:avLst/>
+          </a:prstGeom>
+          <a:noFill/>
+        </p:spPr>
+        <p:txBody>
+          <a:bodyPr wrap="square" rtlCol="0">
+            <a:spAutoFit/>
+          </a:bodyPr>
+          <a:lstStyle/>
+          <a:p>
+            <a:pPr algn="ctr" defTabSz="914377"/>
+            <a:r>
+              <a:rPr lang="en-US" sz="1400" b="1" dirty="0" smtClean="0">
+                <a:solidFill>
+                  <a:srgbClr val="4B5357"/>
+                </a:solidFill>
+                <a:latin typeface="Source Sans Pro" charset="0"/>
+                <a:ea typeface="Source Sans Pro" charset="0"/>
+                <a:cs typeface="Source Sans Pro" charset="0"/>
+              </a:rPr>
+              <a:t>Architecture</a:t>
+            </a:r>
+            <a:endParaRPr lang="en-US" sz="1400" b="1" dirty="0">
+              <a:solidFill>
+                <a:srgbClr val="4B5357"/>
+              </a:solidFill>
+              <a:latin typeface="Source Sans Pro" charset="0"/>
+              <a:ea typeface="Source Sans Pro" charset="0"/>
+              <a:cs typeface="Source Sans Pro" charset="0"/>
+            </a:endParaRPr>
+          </a:p>
+        </p:txBody>
+      </p:sp>
     </p:spTree>
     <p:extLst>
       <p:ext uri="{BB962C8B-B14F-4D97-AF65-F5344CB8AC3E}">

</xml_diff>